<commit_message>
redesign the template master board on fonts.
</commit_message>
<xml_diff>
--- a/files/xlzhuathku_ppt_template.pptx
+++ b/files/xlzhuathku_ppt_template.pptx
@@ -198,7 +198,7 @@
           <a:p>
             <a:fld id="{7BBE4CA1-4AF8-224A-AC3C-6A8A76475C61}" type="datetimeFigureOut">
               <a:rPr lang="en-US" smtClean="0"/>
-              <a:t>9/12/11</a:t>
+              <a:t>1/11/2012</a:t>
             </a:fld>
             <a:endParaRPr lang="en-US"/>
           </a:p>
@@ -364,7 +364,7 @@
           <a:p>
             <a:fld id="{14AE4017-4F76-8044-9AEC-004586A94155}" type="datetimeFigureOut">
               <a:rPr lang="en-US" smtClean="0"/>
-              <a:t>9/12/11</a:t>
+              <a:t>1/11/2012</a:t>
             </a:fld>
             <a:endParaRPr lang="en-US"/>
           </a:p>
@@ -1013,7 +1013,7 @@
           <a:p>
             <a:fld id="{31053DFE-44A7-254C-BDAC-36B719E115F1}" type="datetime1">
               <a:rPr lang="en-US" smtClean="0"/>
-              <a:t>9/12/11</a:t>
+              <a:t>1/11/2012</a:t>
             </a:fld>
             <a:endParaRPr lang="en-US"/>
           </a:p>
@@ -1426,7 +1426,7 @@
           <a:p>
             <a:fld id="{1D3E1B12-EC99-DD4D-B1B3-B77D5EC323E1}" type="datetime1">
               <a:rPr lang="en-US" smtClean="0"/>
-              <a:t>9/12/11</a:t>
+              <a:t>1/11/2012</a:t>
             </a:fld>
             <a:endParaRPr lang="en-US"/>
           </a:p>
@@ -1707,7 +1707,7 @@
           <a:p>
             <a:fld id="{A15A256F-5B90-4245-92C4-3E0996358E5C}" type="datetime1">
               <a:rPr lang="en-US" smtClean="0"/>
-              <a:t>9/12/11</a:t>
+              <a:t>1/11/2012</a:t>
             </a:fld>
             <a:endParaRPr lang="en-US"/>
           </a:p>
@@ -2093,7 +2093,7 @@
           <a:p>
             <a:fld id="{10A2821B-4DD2-0F4D-8A21-133DBD86BA02}" type="datetime1">
               <a:rPr lang="en-US" smtClean="0"/>
-              <a:t>9/12/11</a:t>
+              <a:t>1/11/2012</a:t>
             </a:fld>
             <a:endParaRPr lang="en-US"/>
           </a:p>
@@ -2517,7 +2517,7 @@
           <a:p>
             <a:fld id="{214B112B-C296-F345-87F5-2759BD258B4D}" type="datetime1">
               <a:rPr lang="en-US" smtClean="0"/>
-              <a:t>9/12/11</a:t>
+              <a:t>1/11/2012</a:t>
             </a:fld>
             <a:endParaRPr lang="en-US"/>
           </a:p>
@@ -3115,7 +3115,7 @@
           <a:p>
             <a:fld id="{DC09B0C1-50D8-6B4E-B078-73F266C2F344}" type="datetime1">
               <a:rPr lang="en-US" smtClean="0"/>
-              <a:t>9/12/11</a:t>
+              <a:t>1/11/2012</a:t>
             </a:fld>
             <a:endParaRPr lang="en-US"/>
           </a:p>
@@ -3541,7 +3541,7 @@
           <a:p>
             <a:fld id="{D25D7FF9-C975-8844-AD5D-B9D608853EB8}" type="datetime1">
               <a:rPr lang="en-US" smtClean="0"/>
-              <a:t>9/12/11</a:t>
+              <a:t>1/11/2012</a:t>
             </a:fld>
             <a:endParaRPr lang="en-US"/>
           </a:p>
@@ -3660,7 +3660,7 @@
           <a:p>
             <a:fld id="{A6A3D5E4-120D-1447-A443-87F5FA017540}" type="datetime1">
               <a:rPr lang="en-US" smtClean="0"/>
-              <a:t>9/12/11</a:t>
+              <a:t>1/11/2012</a:t>
             </a:fld>
             <a:endParaRPr lang="en-US"/>
           </a:p>
@@ -3754,7 +3754,7 @@
           <a:p>
             <a:fld id="{4EB5C9DF-4929-B34E-A621-5B3F33074E66}" type="datetime1">
               <a:rPr lang="en-US" smtClean="0"/>
-              <a:t>9/12/11</a:t>
+              <a:t>1/11/2012</a:t>
             </a:fld>
             <a:endParaRPr lang="en-US"/>
           </a:p>
@@ -4036,7 +4036,7 @@
           <a:p>
             <a:fld id="{F59422E4-2DE5-B44F-B04A-4B5288EDC3DC}" type="datetime1">
               <a:rPr lang="en-US" smtClean="0"/>
-              <a:t>9/12/11</a:t>
+              <a:t>1/11/2012</a:t>
             </a:fld>
             <a:endParaRPr lang="en-US"/>
           </a:p>
@@ -4312,7 +4312,7 @@
           <a:p>
             <a:fld id="{712157B5-C1DE-C442-9F32-AC8B3B3DBDDD}" type="datetime1">
               <a:rPr lang="en-US" smtClean="0"/>
-              <a:t>9/12/11</a:t>
+              <a:t>1/11/2012</a:t>
             </a:fld>
             <a:endParaRPr lang="en-US" dirty="0"/>
           </a:p>
@@ -4414,6 +4414,62 @@
       </p:grpSpPr>
       <p:sp>
         <p:nvSpPr>
+          <p:cNvPr id="21" name="Rectangle 20"/>
+          <p:cNvSpPr/>
+          <p:nvPr userDrawn="1"/>
+        </p:nvSpPr>
+        <p:spPr bwMode="ltGray">
+          <a:xfrm>
+            <a:off x="259841" y="2"/>
+            <a:ext cx="1587562" cy="692689"/>
+          </a:xfrm>
+          <a:prstGeom prst="rect">
+            <a:avLst/>
+          </a:prstGeom>
+          <a:solidFill>
+            <a:schemeClr val="tx1">
+              <a:lumMod val="50000"/>
+              <a:lumOff val="50000"/>
+            </a:schemeClr>
+          </a:solidFill>
+          <a:ln w="48000" cap="flat" cmpd="thickThin" algn="ctr">
+            <a:noFill/>
+            <a:prstDash val="solid"/>
+          </a:ln>
+        </p:spPr>
+        <p:style>
+          <a:lnRef idx="2">
+            <a:schemeClr val="accent1"/>
+          </a:lnRef>
+          <a:fillRef idx="1">
+            <a:schemeClr val="accent1"/>
+          </a:fillRef>
+          <a:effectRef idx="0">
+            <a:schemeClr val="accent1"/>
+          </a:effectRef>
+          <a:fontRef idx="minor">
+            <a:schemeClr val="lt1"/>
+          </a:fontRef>
+        </p:style>
+        <p:txBody>
+          <a:bodyPr rtlCol="0" anchor="ctr"/>
+          <a:lstStyle>
+            <a:extLst/>
+          </a:lstStyle>
+          <a:p>
+            <a:pPr algn="r" eaLnBrk="1" latinLnBrk="0" hangingPunct="1"/>
+            <a:endParaRPr kumimoji="0" lang="en-US" dirty="0">
+              <a:solidFill>
+                <a:schemeClr val="accent2">
+                  <a:lumMod val="75000"/>
+                </a:schemeClr>
+              </a:solidFill>
+            </a:endParaRPr>
+          </a:p>
+        </p:txBody>
+      </p:sp>
+      <p:sp>
+        <p:nvSpPr>
           <p:cNvPr id="18" name="Rectangle 17"/>
           <p:cNvSpPr/>
           <p:nvPr userDrawn="1"/>
@@ -4719,7 +4775,7 @@
           <a:p>
             <a:fld id="{FDEDFCCF-60BF-3740-B6B6-663D67A894BB}" type="datetime1">
               <a:rPr lang="en-US" smtClean="0"/>
-              <a:t>9/12/11</a:t>
+              <a:t>1/11/2012</a:t>
             </a:fld>
             <a:endParaRPr lang="en-US" dirty="0"/>
           </a:p>
@@ -4974,7 +5030,7 @@
         </p:nvSpPr>
         <p:spPr bwMode="ltGray">
           <a:xfrm>
-            <a:off x="180001" y="-2"/>
+            <a:off x="169841" y="-2"/>
             <a:ext cx="180000" cy="692693"/>
           </a:xfrm>
           <a:prstGeom prst="rect">
@@ -5013,62 +5069,6 @@
           <a:p>
             <a:pPr algn="ctr" eaLnBrk="1" latinLnBrk="0" hangingPunct="1"/>
             <a:endParaRPr kumimoji="0" lang="en-US">
-              <a:solidFill>
-                <a:schemeClr val="accent2">
-                  <a:lumMod val="75000"/>
-                </a:schemeClr>
-              </a:solidFill>
-            </a:endParaRPr>
-          </a:p>
-        </p:txBody>
-      </p:sp>
-      <p:sp>
-        <p:nvSpPr>
-          <p:cNvPr id="21" name="Rectangle 20"/>
-          <p:cNvSpPr/>
-          <p:nvPr userDrawn="1"/>
-        </p:nvSpPr>
-        <p:spPr bwMode="ltGray">
-          <a:xfrm>
-            <a:off x="360001" y="2"/>
-            <a:ext cx="1487402" cy="692689"/>
-          </a:xfrm>
-          <a:prstGeom prst="rect">
-            <a:avLst/>
-          </a:prstGeom>
-          <a:solidFill>
-            <a:schemeClr val="tx1">
-              <a:lumMod val="50000"/>
-              <a:lumOff val="50000"/>
-            </a:schemeClr>
-          </a:solidFill>
-          <a:ln w="48000" cap="flat" cmpd="thickThin" algn="ctr">
-            <a:noFill/>
-            <a:prstDash val="solid"/>
-          </a:ln>
-        </p:spPr>
-        <p:style>
-          <a:lnRef idx="2">
-            <a:schemeClr val="accent1"/>
-          </a:lnRef>
-          <a:fillRef idx="1">
-            <a:schemeClr val="accent1"/>
-          </a:fillRef>
-          <a:effectRef idx="0">
-            <a:schemeClr val="accent1"/>
-          </a:effectRef>
-          <a:fontRef idx="minor">
-            <a:schemeClr val="lt1"/>
-          </a:fontRef>
-        </p:style>
-        <p:txBody>
-          <a:bodyPr rtlCol="0" anchor="ctr"/>
-          <a:lstStyle>
-            <a:extLst/>
-          </a:lstStyle>
-          <a:p>
-            <a:pPr algn="r" eaLnBrk="1" latinLnBrk="0" hangingPunct="1"/>
-            <a:endParaRPr kumimoji="0" lang="en-US" dirty="0">
               <a:solidFill>
                 <a:schemeClr val="accent2">
                   <a:lumMod val="75000"/>
@@ -5500,7 +5500,7 @@
   <p:timing>
     <p:tnLst>
       <p:par>
-        <p:cTn xmlns:p14="http://schemas.microsoft.com/office/powerpoint/2010/main" id="1" dur="indefinite" restart="never" nodeType="tmRoot"/>
+        <p:cTn id="1" dur="indefinite" restart="never" nodeType="tmRoot"/>
       </p:par>
     </p:tnLst>
   </p:timing>
@@ -5727,7 +5727,7 @@
           <a:p>
             <a:fld id="{F22CE95E-7377-294A-9DD7-0645117B5595}" type="datetime1">
               <a:rPr lang="en-US" smtClean="0"/>
-              <a:t>9/12/11</a:t>
+              <a:t>1/11/2012</a:t>
             </a:fld>
             <a:endParaRPr lang="en-US"/>
           </a:p>
@@ -5872,7 +5872,7 @@
           <a:p>
             <a:fld id="{FB44CAA8-A228-C543-A92C-C08767E71049}" type="datetime1">
               <a:rPr lang="en-US" smtClean="0"/>
-              <a:t>9/12/11</a:t>
+              <a:t>1/11/2012</a:t>
             </a:fld>
             <a:endParaRPr lang="en-US"/>
           </a:p>
@@ -6157,7 +6157,7 @@
           <a:p>
             <a:fld id="{D72B4C5A-A4CF-3C41-90E6-A666107EB9D1}" type="datetime1">
               <a:rPr lang="en-US" smtClean="0"/>
-              <a:t>9/12/11</a:t>
+              <a:t>1/11/2012</a:t>
             </a:fld>
             <a:endParaRPr lang="en-US"/>
           </a:p>
@@ -6263,77 +6263,19 @@
         <a:srgbClr val="663300"/>
       </a:folHlink>
     </a:clrScheme>
-    <a:fontScheme name="Module">
+    <a:fontScheme name="xlzhuathku_1">
       <a:majorFont>
-        <a:latin typeface="Corbel"/>
+        <a:latin typeface="Candara"/>
         <a:ea typeface=""/>
         <a:cs typeface=""/>
-        <a:font script="Jpan" typeface="ＭＳ ゴシック"/>
-        <a:font script="Hang" typeface="HY엽서L"/>
-        <a:font script="Hans" typeface="华文楷体"/>
-        <a:font script="Hant" typeface="新細明體"/>
-        <a:font script="Arab" typeface="Tahoma"/>
-        <a:font script="Hebr" typeface="Miriam"/>
-        <a:font script="Thai" typeface="DilleniaUPC"/>
-        <a:font script="Ethi" typeface="Nyala"/>
-        <a:font script="Beng" typeface="Vrinda"/>
-        <a:font script="Gujr" typeface="Shruti"/>
-        <a:font script="Khmr" typeface="DaunPenh"/>
-        <a:font script="Knda" typeface="Tunga"/>
-        <a:font script="Guru" typeface="Raavi"/>
-        <a:font script="Cans" typeface="Euphemia"/>
-        <a:font script="Cher" typeface="Plantagenet Cherokee"/>
-        <a:font script="Yiii" typeface="Microsoft Yi Baiti"/>
-        <a:font script="Tibt" typeface="Microsoft Himalaya"/>
-        <a:font script="Thaa" typeface="MV Boli"/>
-        <a:font script="Deva" typeface="Mangal"/>
-        <a:font script="Telu" typeface="Gautami"/>
-        <a:font script="Taml" typeface="Latha"/>
-        <a:font script="Syrc" typeface="Estrangelo Edessa"/>
-        <a:font script="Orya" typeface="Kalinga"/>
-        <a:font script="Mlym" typeface="Kartika"/>
-        <a:font script="Laoo" typeface="DokChampa"/>
-        <a:font script="Sinh" typeface="Iskoola Pota"/>
-        <a:font script="Mong" typeface="Mongolian Baiti"/>
-        <a:font script="Viet" typeface="Arial"/>
-        <a:font script="Uigh" typeface="Microsoft Uighur"/>
       </a:majorFont>
       <a:minorFont>
-        <a:latin typeface="Corbel"/>
+        <a:latin typeface="Gill Sans MT"/>
         <a:ea typeface=""/>
         <a:cs typeface=""/>
-        <a:font script="Jpan" typeface="ＭＳ ゴシック"/>
-        <a:font script="Hang" typeface="HY엽서L"/>
-        <a:font script="Hans" typeface="华文楷体"/>
-        <a:font script="Hant" typeface="新細明體"/>
-        <a:font script="Arab" typeface="Tahoma"/>
-        <a:font script="Hebr" typeface="Miriam"/>
-        <a:font script="Thai" typeface="DilleniaUPC"/>
-        <a:font script="Ethi" typeface="Nyala"/>
-        <a:font script="Beng" typeface="Vrinda"/>
-        <a:font script="Gujr" typeface="Shruti"/>
-        <a:font script="Khmr" typeface="DaunPenh"/>
-        <a:font script="Knda" typeface="Tunga"/>
-        <a:font script="Guru" typeface="Raavi"/>
-        <a:font script="Cans" typeface="Euphemia"/>
-        <a:font script="Cher" typeface="Plantagenet Cherokee"/>
-        <a:font script="Yiii" typeface="Microsoft Yi Baiti"/>
-        <a:font script="Tibt" typeface="Microsoft Himalaya"/>
-        <a:font script="Thaa" typeface="MV Boli"/>
-        <a:font script="Deva" typeface="Mangal"/>
-        <a:font script="Telu" typeface="Gautami"/>
-        <a:font script="Taml" typeface="Latha"/>
-        <a:font script="Syrc" typeface="Estrangelo Edessa"/>
-        <a:font script="Orya" typeface="Kalinga"/>
-        <a:font script="Mlym" typeface="Kartika"/>
-        <a:font script="Laoo" typeface="DokChampa"/>
-        <a:font script="Sinh" typeface="Iskoola Pota"/>
-        <a:font script="Mong" typeface="Mongolian Baiti"/>
-        <a:font script="Viet" typeface="Arial"/>
-        <a:font script="Uigh" typeface="Microsoft Uighur"/>
       </a:minorFont>
     </a:fontScheme>
-    <a:fmtScheme name="Module">
+    <a:fmtScheme name="Urban">
       <a:fillStyleLst>
         <a:solidFill>
           <a:schemeClr val="phClr"/>
@@ -6342,66 +6284,66 @@
           <a:gsLst>
             <a:gs pos="0">
               <a:schemeClr val="phClr">
-                <a:tint val="50000"/>
-                <a:satMod val="300000"/>
+                <a:tint val="1000"/>
+                <a:satMod val="255000"/>
               </a:schemeClr>
             </a:gs>
-            <a:gs pos="35000">
+            <a:gs pos="55000">
               <a:schemeClr val="phClr">
-                <a:tint val="37000"/>
-                <a:satMod val="300000"/>
+                <a:tint val="12000"/>
+                <a:satMod val="255000"/>
               </a:schemeClr>
             </a:gs>
             <a:gs pos="100000">
               <a:schemeClr val="phClr">
-                <a:tint val="15000"/>
-                <a:satMod val="350000"/>
+                <a:tint val="45000"/>
+                <a:satMod val="250000"/>
               </a:schemeClr>
             </a:gs>
           </a:gsLst>
-          <a:lin ang="16200000" scaled="1"/>
+          <a:path path="circle">
+            <a:fillToRect l="-40000" t="-90000" r="140000" b="190000"/>
+          </a:path>
         </a:gradFill>
         <a:gradFill rotWithShape="1">
           <a:gsLst>
             <a:gs pos="0">
               <a:schemeClr val="phClr">
-                <a:shade val="47500"/>
-                <a:satMod val="137000"/>
+                <a:tint val="43000"/>
+                <a:satMod val="165000"/>
               </a:schemeClr>
             </a:gs>
             <a:gs pos="55000">
               <a:schemeClr val="phClr">
-                <a:shade val="69000"/>
-                <a:satMod val="137000"/>
+                <a:tint val="83000"/>
+                <a:satMod val="155000"/>
               </a:schemeClr>
             </a:gs>
             <a:gs pos="100000">
               <a:schemeClr val="phClr">
-                <a:shade val="98000"/>
-                <a:satMod val="137000"/>
+                <a:shade val="85000"/>
               </a:schemeClr>
             </a:gs>
           </a:gsLst>
-          <a:lin ang="16200000" scaled="0"/>
+          <a:path path="circle">
+            <a:fillToRect l="-40000" t="-90000" r="140000" b="190000"/>
+          </a:path>
         </a:gradFill>
       </a:fillStyleLst>
       <a:lnStyleLst>
-        <a:ln w="6350" cap="rnd" cmpd="sng" algn="ctr">
-          <a:solidFill>
-            <a:schemeClr val="phClr">
-              <a:shade val="95000"/>
-              <a:satMod val="105000"/>
-            </a:schemeClr>
-          </a:solidFill>
-          <a:prstDash val="solid"/>
-        </a:ln>
-        <a:ln w="48000" cap="flat" cmpd="thickThin" algn="ctr">
+        <a:ln w="9525" cap="flat" cmpd="sng" algn="ctr">
           <a:solidFill>
             <a:schemeClr val="phClr"/>
           </a:solidFill>
           <a:prstDash val="solid"/>
         </a:ln>
-        <a:ln w="48500" cap="flat" cmpd="thickThin" algn="ctr">
+        <a:ln w="19050" cap="flat" cmpd="sng" algn="ctr">
+          <a:solidFill>
+            <a:schemeClr val="phClr"/>
+          </a:solidFill>
+          <a:prstDash val="solid"/>
+        </a:ln>
+        <a:ln w="31750" cap="flat" cmpd="sng" algn="ctr">
           <a:solidFill>
             <a:schemeClr val="phClr"/>
           </a:solidFill>
@@ -6411,27 +6353,27 @@
       <a:effectStyleLst>
         <a:effectStyle>
           <a:effectLst>
-            <a:outerShdw blurRad="45000" dist="25000" dir="5400000" rotWithShape="0">
+            <a:outerShdw blurRad="51500" dist="25400" dir="5400000" rotWithShape="0">
               <a:srgbClr val="000000">
-                <a:alpha val="38000"/>
+                <a:alpha val="40000"/>
               </a:srgbClr>
             </a:outerShdw>
           </a:effectLst>
         </a:effectStyle>
         <a:effectStyle>
           <a:effectLst>
-            <a:outerShdw blurRad="39000" dist="25400" dir="5400000" rotWithShape="0">
+            <a:outerShdw blurRad="50800" dist="25400" dir="5400000" rotWithShape="0">
               <a:srgbClr val="000000">
-                <a:alpha val="38000"/>
+                <a:alpha val="45000"/>
               </a:srgbClr>
             </a:outerShdw>
           </a:effectLst>
         </a:effectStyle>
         <a:effectStyle>
           <a:effectLst>
-            <a:outerShdw blurRad="39000" dist="25400" dir="5400000" rotWithShape="0">
+            <a:outerShdw blurRad="50800" dist="25400" dir="5400000" rotWithShape="0">
               <a:srgbClr val="000000">
-                <a:alpha val="38000"/>
+                <a:alpha val="45000"/>
               </a:srgbClr>
             </a:outerShdw>
           </a:effectLst>
@@ -6439,12 +6381,17 @@
             <a:camera prst="orthographicFront" fov="0">
               <a:rot lat="0" lon="0" rev="0"/>
             </a:camera>
-            <a:lightRig rig="threePt" dir="t">
-              <a:rot lat="0" lon="0" rev="1800000"/>
+            <a:lightRig rig="flat" dir="t">
+              <a:rot lat="0" lon="0" rev="20040000"/>
             </a:lightRig>
           </a:scene3d>
-          <a:sp3d prstMaterial="matte">
-            <a:bevelT h="20000"/>
+          <a:sp3d contourW="12700" prstMaterial="dkEdge">
+            <a:bevelT w="25400" h="38100" prst="convex"/>
+            <a:contourClr>
+              <a:schemeClr val="phClr">
+                <a:satMod val="115000"/>
+              </a:schemeClr>
+            </a:contourClr>
           </a:sp3d>
         </a:effectStyle>
       </a:effectStyleLst>

</xml_diff>

<commit_message>
add file index to file folder
</commit_message>
<xml_diff>
--- a/files/xlzhuathku_ppt_template.pptx
+++ b/files/xlzhuathku_ppt_template.pptx
@@ -198,7 +198,8 @@
           <a:p>
             <a:fld id="{7BBE4CA1-4AF8-224A-AC3C-6A8A76475C61}" type="datetimeFigureOut">
               <a:rPr lang="en-US" smtClean="0"/>
-              <a:t>9/12/11</a:t>
+              <a:pPr/>
+              <a:t>8/20/2012</a:t>
             </a:fld>
             <a:endParaRPr lang="en-US"/>
           </a:p>
@@ -264,6 +265,7 @@
           <a:p>
             <a:fld id="{00AFEBEE-2A09-5B46-AD77-A78B290BBB6D}" type="slidenum">
               <a:rPr lang="en-US" smtClean="0"/>
+              <a:pPr/>
               <a:t>‹#›</a:t>
             </a:fld>
             <a:endParaRPr lang="en-US"/>
@@ -273,7 +275,7 @@
     </p:spTree>
     <p:extLst>
       <p:ext uri="{BB962C8B-B14F-4D97-AF65-F5344CB8AC3E}">
-        <p14:creationId xmlns:p14="http://schemas.microsoft.com/office/powerpoint/2010/main" val="1185554399"/>
+        <p14:creationId xmlns:p14="http://schemas.microsoft.com/office/powerpoint/2010/main" xmlns="" val="1185554399"/>
       </p:ext>
     </p:extLst>
   </p:cSld>
@@ -364,7 +366,8 @@
           <a:p>
             <a:fld id="{14AE4017-4F76-8044-9AEC-004586A94155}" type="datetimeFigureOut">
               <a:rPr lang="en-US" smtClean="0"/>
-              <a:t>9/12/11</a:t>
+              <a:pPr/>
+              <a:t>8/20/2012</a:t>
             </a:fld>
             <a:endParaRPr lang="en-US"/>
           </a:p>
@@ -523,6 +526,7 @@
           <a:p>
             <a:fld id="{13535FA5-4185-1B4F-9DB7-D6C60F4ADA9D}" type="slidenum">
               <a:rPr lang="en-US" smtClean="0"/>
+              <a:pPr/>
               <a:t>‹#›</a:t>
             </a:fld>
             <a:endParaRPr lang="en-US"/>
@@ -532,7 +536,7 @@
     </p:spTree>
     <p:extLst>
       <p:ext uri="{BB962C8B-B14F-4D97-AF65-F5344CB8AC3E}">
-        <p14:creationId xmlns:p14="http://schemas.microsoft.com/office/powerpoint/2010/main" val="3627754728"/>
+        <p14:creationId xmlns:p14="http://schemas.microsoft.com/office/powerpoint/2010/main" xmlns="" val="3627754728"/>
       </p:ext>
     </p:extLst>
   </p:cSld>
@@ -1013,7 +1017,8 @@
           <a:p>
             <a:fld id="{31053DFE-44A7-254C-BDAC-36B719E115F1}" type="datetime1">
               <a:rPr lang="en-US" smtClean="0"/>
-              <a:t>9/12/11</a:t>
+              <a:pPr/>
+              <a:t>8/20/2012</a:t>
             </a:fld>
             <a:endParaRPr lang="en-US"/>
           </a:p>
@@ -1426,7 +1431,8 @@
           <a:p>
             <a:fld id="{1D3E1B12-EC99-DD4D-B1B3-B77D5EC323E1}" type="datetime1">
               <a:rPr lang="en-US" smtClean="0"/>
-              <a:t>9/12/11</a:t>
+              <a:pPr/>
+              <a:t>8/20/2012</a:t>
             </a:fld>
             <a:endParaRPr lang="en-US"/>
           </a:p>
@@ -1472,6 +1478,7 @@
           <a:p>
             <a:fld id="{D78EC303-C52C-464C-ACAF-04B27DC9A63D}" type="slidenum">
               <a:rPr lang="en-US" smtClean="0"/>
+              <a:pPr/>
               <a:t>‹#›</a:t>
             </a:fld>
             <a:endParaRPr lang="en-US"/>
@@ -1707,7 +1714,8 @@
           <a:p>
             <a:fld id="{A15A256F-5B90-4245-92C4-3E0996358E5C}" type="datetime1">
               <a:rPr lang="en-US" smtClean="0"/>
-              <a:t>9/12/11</a:t>
+              <a:pPr/>
+              <a:t>8/20/2012</a:t>
             </a:fld>
             <a:endParaRPr lang="en-US"/>
           </a:p>
@@ -1763,6 +1771,7 @@
           <a:p>
             <a:fld id="{D78EC303-C52C-464C-ACAF-04B27DC9A63D}" type="slidenum">
               <a:rPr lang="en-US" smtClean="0"/>
+              <a:pPr/>
               <a:t>‹#›</a:t>
             </a:fld>
             <a:endParaRPr lang="en-US" dirty="0"/>
@@ -2093,7 +2102,8 @@
           <a:p>
             <a:fld id="{10A2821B-4DD2-0F4D-8A21-133DBD86BA02}" type="datetime1">
               <a:rPr lang="en-US" smtClean="0"/>
-              <a:t>9/12/11</a:t>
+              <a:pPr/>
+              <a:t>8/20/2012</a:t>
             </a:fld>
             <a:endParaRPr lang="en-US"/>
           </a:p>
@@ -2139,6 +2149,7 @@
           <a:p>
             <a:fld id="{D78EC303-C52C-464C-ACAF-04B27DC9A63D}" type="slidenum">
               <a:rPr lang="en-US" smtClean="0"/>
+              <a:pPr/>
               <a:t>‹#›</a:t>
             </a:fld>
             <a:endParaRPr lang="en-US"/>
@@ -2517,7 +2528,8 @@
           <a:p>
             <a:fld id="{214B112B-C296-F345-87F5-2759BD258B4D}" type="datetime1">
               <a:rPr lang="en-US" smtClean="0"/>
-              <a:t>9/12/11</a:t>
+              <a:pPr/>
+              <a:t>8/20/2012</a:t>
             </a:fld>
             <a:endParaRPr lang="en-US"/>
           </a:p>
@@ -2563,6 +2575,7 @@
           <a:p>
             <a:fld id="{D78EC303-C52C-464C-ACAF-04B27DC9A63D}" type="slidenum">
               <a:rPr lang="en-US" smtClean="0"/>
+              <a:pPr/>
               <a:t>‹#›</a:t>
             </a:fld>
             <a:endParaRPr lang="en-US"/>
@@ -3115,7 +3128,8 @@
           <a:p>
             <a:fld id="{DC09B0C1-50D8-6B4E-B078-73F266C2F344}" type="datetime1">
               <a:rPr lang="en-US" smtClean="0"/>
-              <a:t>9/12/11</a:t>
+              <a:pPr/>
+              <a:t>8/20/2012</a:t>
             </a:fld>
             <a:endParaRPr lang="en-US"/>
           </a:p>
@@ -3161,6 +3175,7 @@
           <a:p>
             <a:fld id="{D78EC303-C52C-464C-ACAF-04B27DC9A63D}" type="slidenum">
               <a:rPr lang="en-US" smtClean="0"/>
+              <a:pPr/>
               <a:t>‹#›</a:t>
             </a:fld>
             <a:endParaRPr lang="en-US"/>
@@ -3541,7 +3556,8 @@
           <a:p>
             <a:fld id="{D25D7FF9-C975-8844-AD5D-B9D608853EB8}" type="datetime1">
               <a:rPr lang="en-US" smtClean="0"/>
-              <a:t>9/12/11</a:t>
+              <a:pPr/>
+              <a:t>8/20/2012</a:t>
             </a:fld>
             <a:endParaRPr lang="en-US"/>
           </a:p>
@@ -3587,6 +3603,7 @@
           <a:p>
             <a:fld id="{D78EC303-C52C-464C-ACAF-04B27DC9A63D}" type="slidenum">
               <a:rPr lang="en-US" smtClean="0"/>
+              <a:pPr/>
               <a:t>‹#›</a:t>
             </a:fld>
             <a:endParaRPr lang="en-US"/>
@@ -3660,7 +3677,8 @@
           <a:p>
             <a:fld id="{A6A3D5E4-120D-1447-A443-87F5FA017540}" type="datetime1">
               <a:rPr lang="en-US" smtClean="0"/>
-              <a:t>9/12/11</a:t>
+              <a:pPr/>
+              <a:t>8/20/2012</a:t>
             </a:fld>
             <a:endParaRPr lang="en-US"/>
           </a:p>
@@ -3706,6 +3724,7 @@
           <a:p>
             <a:fld id="{D78EC303-C52C-464C-ACAF-04B27DC9A63D}" type="slidenum">
               <a:rPr lang="en-US" smtClean="0"/>
+              <a:pPr/>
               <a:t>‹#›</a:t>
             </a:fld>
             <a:endParaRPr lang="en-US"/>
@@ -3754,7 +3773,8 @@
           <a:p>
             <a:fld id="{4EB5C9DF-4929-B34E-A621-5B3F33074E66}" type="datetime1">
               <a:rPr lang="en-US" smtClean="0"/>
-              <a:t>9/12/11</a:t>
+              <a:pPr/>
+              <a:t>8/20/2012</a:t>
             </a:fld>
             <a:endParaRPr lang="en-US"/>
           </a:p>
@@ -3800,6 +3820,7 @@
           <a:p>
             <a:fld id="{D78EC303-C52C-464C-ACAF-04B27DC9A63D}" type="slidenum">
               <a:rPr lang="en-US" smtClean="0"/>
+              <a:pPr/>
               <a:t>‹#›</a:t>
             </a:fld>
             <a:endParaRPr lang="en-US"/>
@@ -4036,7 +4057,8 @@
           <a:p>
             <a:fld id="{F59422E4-2DE5-B44F-B04A-4B5288EDC3DC}" type="datetime1">
               <a:rPr lang="en-US" smtClean="0"/>
-              <a:t>9/12/11</a:t>
+              <a:pPr/>
+              <a:t>8/20/2012</a:t>
             </a:fld>
             <a:endParaRPr lang="en-US"/>
           </a:p>
@@ -4312,7 +4334,8 @@
           <a:p>
             <a:fld id="{712157B5-C1DE-C442-9F32-AC8B3B3DBDDD}" type="datetime1">
               <a:rPr lang="en-US" smtClean="0"/>
-              <a:t>9/12/11</a:t>
+              <a:pPr/>
+              <a:t>8/20/2012</a:t>
             </a:fld>
             <a:endParaRPr lang="en-US" dirty="0"/>
           </a:p>
@@ -4376,6 +4399,7 @@
           <a:p>
             <a:fld id="{D78EC303-C52C-464C-ACAF-04B27DC9A63D}" type="slidenum">
               <a:rPr lang="en-US" smtClean="0"/>
+              <a:pPr/>
               <a:t>‹#›</a:t>
             </a:fld>
             <a:endParaRPr lang="en-US"/>
@@ -4719,7 +4743,8 @@
           <a:p>
             <a:fld id="{FDEDFCCF-60BF-3740-B6B6-663D67A894BB}" type="datetime1">
               <a:rPr lang="en-US" smtClean="0"/>
-              <a:t>9/12/11</a:t>
+              <a:pPr/>
+              <a:t>8/20/2012</a:t>
             </a:fld>
             <a:endParaRPr lang="en-US" dirty="0"/>
           </a:p>
@@ -5109,9 +5134,9 @@
             </a:schemeClr>
           </a:solidFill>
           <a:effectLst/>
-          <a:latin typeface="+mj-lt"/>
-          <a:ea typeface="+mj-ea"/>
-          <a:cs typeface="+mj-cs"/>
+          <a:latin typeface="Segoe UI" pitchFamily="34" charset="0"/>
+          <a:ea typeface="Segoe UI" pitchFamily="34" charset="0"/>
+          <a:cs typeface="Segoe UI" pitchFamily="34" charset="0"/>
         </a:defRPr>
       </a:lvl1pPr>
       <a:extLst/>
@@ -5131,9 +5156,9 @@
           <a:solidFill>
             <a:schemeClr val="tx1"/>
           </a:solidFill>
-          <a:latin typeface="+mn-lt"/>
-          <a:ea typeface="+mn-ea"/>
-          <a:cs typeface="+mn-cs"/>
+          <a:latin typeface="Segoe UI" pitchFamily="34" charset="0"/>
+          <a:ea typeface="Segoe UI" pitchFamily="34" charset="0"/>
+          <a:cs typeface="Segoe UI" pitchFamily="34" charset="0"/>
         </a:defRPr>
       </a:lvl1pPr>
       <a:lvl2pPr marL="731520" indent="-274320" algn="l" rtl="0" eaLnBrk="1" latinLnBrk="0" hangingPunct="1">
@@ -5150,9 +5175,9 @@
           <a:solidFill>
             <a:schemeClr val="tx1"/>
           </a:solidFill>
-          <a:latin typeface="+mn-lt"/>
-          <a:ea typeface="+mn-ea"/>
-          <a:cs typeface="+mn-cs"/>
+          <a:latin typeface="Segoe UI" pitchFamily="34" charset="0"/>
+          <a:ea typeface="Segoe UI" pitchFamily="34" charset="0"/>
+          <a:cs typeface="Segoe UI" pitchFamily="34" charset="0"/>
         </a:defRPr>
       </a:lvl2pPr>
       <a:lvl3pPr marL="996696" indent="-228600" algn="l" rtl="0" eaLnBrk="1" latinLnBrk="0" hangingPunct="1">
@@ -5168,9 +5193,9 @@
           <a:solidFill>
             <a:schemeClr val="tx1"/>
           </a:solidFill>
-          <a:latin typeface="+mn-lt"/>
-          <a:ea typeface="+mn-ea"/>
-          <a:cs typeface="+mn-cs"/>
+          <a:latin typeface="Segoe UI" pitchFamily="34" charset="0"/>
+          <a:ea typeface="Segoe UI" pitchFamily="34" charset="0"/>
+          <a:cs typeface="Segoe UI" pitchFamily="34" charset="0"/>
         </a:defRPr>
       </a:lvl3pPr>
       <a:lvl4pPr marL="1216152" indent="-182880" algn="l" rtl="0" eaLnBrk="1" latinLnBrk="0" hangingPunct="1">
@@ -5186,9 +5211,9 @@
           <a:solidFill>
             <a:schemeClr val="tx1"/>
           </a:solidFill>
-          <a:latin typeface="+mn-lt"/>
-          <a:ea typeface="+mn-ea"/>
-          <a:cs typeface="+mn-cs"/>
+          <a:latin typeface="Segoe UI" pitchFamily="34" charset="0"/>
+          <a:ea typeface="Segoe UI" pitchFamily="34" charset="0"/>
+          <a:cs typeface="Segoe UI" pitchFamily="34" charset="0"/>
         </a:defRPr>
       </a:lvl4pPr>
       <a:lvl5pPr marL="1426464" indent="-182880" algn="l" rtl="0" eaLnBrk="1" latinLnBrk="0" hangingPunct="1">
@@ -5204,9 +5229,9 @@
           <a:solidFill>
             <a:schemeClr val="tx1"/>
           </a:solidFill>
-          <a:latin typeface="+mn-lt"/>
-          <a:ea typeface="+mn-ea"/>
-          <a:cs typeface="+mn-cs"/>
+          <a:latin typeface="Segoe UI" pitchFamily="34" charset="0"/>
+          <a:ea typeface="Segoe UI" pitchFamily="34" charset="0"/>
+          <a:cs typeface="Segoe UI" pitchFamily="34" charset="0"/>
         </a:defRPr>
       </a:lvl5pPr>
       <a:lvl6pPr marL="1627632" indent="-182880" algn="l" rtl="0" eaLnBrk="1" latinLnBrk="0" hangingPunct="1">
@@ -5490,7 +5515,7 @@
     </p:spTree>
     <p:extLst>
       <p:ext uri="{BB962C8B-B14F-4D97-AF65-F5344CB8AC3E}">
-        <p14:creationId xmlns:p14="http://schemas.microsoft.com/office/powerpoint/2010/main" val="3367217013"/>
+        <p14:creationId xmlns:p14="http://schemas.microsoft.com/office/powerpoint/2010/main" xmlns="" val="3367217013"/>
       </p:ext>
     </p:extLst>
   </p:cSld>
@@ -5500,7 +5525,7 @@
   <p:timing>
     <p:tnLst>
       <p:par>
-        <p:cTn xmlns:p14="http://schemas.microsoft.com/office/powerpoint/2010/main" id="1" dur="indefinite" restart="never" nodeType="tmRoot"/>
+        <p:cTn id="1" dur="indefinite" restart="never" nodeType="tmRoot"/>
       </p:par>
     </p:tnLst>
   </p:timing>
@@ -5727,7 +5752,8 @@
           <a:p>
             <a:fld id="{F22CE95E-7377-294A-9DD7-0645117B5595}" type="datetime1">
               <a:rPr lang="en-US" smtClean="0"/>
-              <a:t>9/12/11</a:t>
+              <a:pPr/>
+              <a:t>8/20/2012</a:t>
             </a:fld>
             <a:endParaRPr lang="en-US"/>
           </a:p>
@@ -5773,6 +5799,7 @@
           <a:p>
             <a:fld id="{D78EC303-C52C-464C-ACAF-04B27DC9A63D}" type="slidenum">
               <a:rPr lang="en-US" smtClean="0"/>
+              <a:pPr/>
               <a:t>2</a:t>
             </a:fld>
             <a:endParaRPr lang="en-US"/>
@@ -5782,7 +5809,7 @@
     </p:spTree>
     <p:extLst>
       <p:ext uri="{BB962C8B-B14F-4D97-AF65-F5344CB8AC3E}">
-        <p14:creationId xmlns:p14="http://schemas.microsoft.com/office/powerpoint/2010/main" val="224190129"/>
+        <p14:creationId xmlns:p14="http://schemas.microsoft.com/office/powerpoint/2010/main" xmlns="" val="224190129"/>
       </p:ext>
     </p:extLst>
   </p:cSld>
@@ -5872,7 +5899,8 @@
           <a:p>
             <a:fld id="{FB44CAA8-A228-C543-A92C-C08767E71049}" type="datetime1">
               <a:rPr lang="en-US" smtClean="0"/>
-              <a:t>9/12/11</a:t>
+              <a:pPr/>
+              <a:t>8/20/2012</a:t>
             </a:fld>
             <a:endParaRPr lang="en-US"/>
           </a:p>
@@ -5918,6 +5946,7 @@
           <a:p>
             <a:fld id="{D78EC303-C52C-464C-ACAF-04B27DC9A63D}" type="slidenum">
               <a:rPr lang="en-US" smtClean="0"/>
+              <a:pPr/>
               <a:t>3</a:t>
             </a:fld>
             <a:endParaRPr lang="en-US"/>
@@ -5927,7 +5956,7 @@
     </p:spTree>
     <p:extLst>
       <p:ext uri="{BB962C8B-B14F-4D97-AF65-F5344CB8AC3E}">
-        <p14:creationId xmlns:p14="http://schemas.microsoft.com/office/powerpoint/2010/main" val="2821938195"/>
+        <p14:creationId xmlns:p14="http://schemas.microsoft.com/office/powerpoint/2010/main" xmlns="" val="2821938195"/>
       </p:ext>
     </p:extLst>
   </p:cSld>
@@ -6157,7 +6186,8 @@
           <a:p>
             <a:fld id="{D72B4C5A-A4CF-3C41-90E6-A666107EB9D1}" type="datetime1">
               <a:rPr lang="en-US" smtClean="0"/>
-              <a:t>9/12/11</a:t>
+              <a:pPr/>
+              <a:t>8/20/2012</a:t>
             </a:fld>
             <a:endParaRPr lang="en-US"/>
           </a:p>
@@ -6203,6 +6233,7 @@
           <a:p>
             <a:fld id="{D78EC303-C52C-464C-ACAF-04B27DC9A63D}" type="slidenum">
               <a:rPr lang="en-US" smtClean="0"/>
+              <a:pPr/>
               <a:t>4</a:t>
             </a:fld>
             <a:endParaRPr lang="en-US"/>
@@ -6212,7 +6243,7 @@
     </p:spTree>
     <p:extLst>
       <p:ext uri="{BB962C8B-B14F-4D97-AF65-F5344CB8AC3E}">
-        <p14:creationId xmlns:p14="http://schemas.microsoft.com/office/powerpoint/2010/main" val="3554415902"/>
+        <p14:creationId xmlns:p14="http://schemas.microsoft.com/office/powerpoint/2010/main" xmlns="" val="3554415902"/>
       </p:ext>
     </p:extLst>
   </p:cSld>

</xml_diff>

<commit_message>
change ppt template to a better font
</commit_message>
<xml_diff>
--- a/files/xlzhuathku_ppt_template.pptx
+++ b/files/xlzhuathku_ppt_template.pptx
@@ -199,7 +199,7 @@
             <a:fld id="{7BBE4CA1-4AF8-224A-AC3C-6A8A76475C61}" type="datetimeFigureOut">
               <a:rPr lang="en-US" smtClean="0"/>
               <a:pPr/>
-              <a:t>8/20/2012</a:t>
+              <a:t>11/27/2012</a:t>
             </a:fld>
             <a:endParaRPr lang="en-US"/>
           </a:p>
@@ -275,7 +275,7 @@
     </p:spTree>
     <p:extLst>
       <p:ext uri="{BB962C8B-B14F-4D97-AF65-F5344CB8AC3E}">
-        <p14:creationId xmlns:p14="http://schemas.microsoft.com/office/powerpoint/2010/main" xmlns="" val="1185554399"/>
+        <p14:creationId xmlns="" xmlns:p14="http://schemas.microsoft.com/office/powerpoint/2010/main" val="1185554399"/>
       </p:ext>
     </p:extLst>
   </p:cSld>
@@ -367,7 +367,7 @@
             <a:fld id="{14AE4017-4F76-8044-9AEC-004586A94155}" type="datetimeFigureOut">
               <a:rPr lang="en-US" smtClean="0"/>
               <a:pPr/>
-              <a:t>8/20/2012</a:t>
+              <a:t>11/27/2012</a:t>
             </a:fld>
             <a:endParaRPr lang="en-US"/>
           </a:p>
@@ -536,7 +536,7 @@
     </p:spTree>
     <p:extLst>
       <p:ext uri="{BB962C8B-B14F-4D97-AF65-F5344CB8AC3E}">
-        <p14:creationId xmlns:p14="http://schemas.microsoft.com/office/powerpoint/2010/main" xmlns="" val="3627754728"/>
+        <p14:creationId xmlns="" xmlns:p14="http://schemas.microsoft.com/office/powerpoint/2010/main" val="3627754728"/>
       </p:ext>
     </p:extLst>
   </p:cSld>
@@ -1018,7 +1018,7 @@
             <a:fld id="{31053DFE-44A7-254C-BDAC-36B719E115F1}" type="datetime1">
               <a:rPr lang="en-US" smtClean="0"/>
               <a:pPr/>
-              <a:t>8/20/2012</a:t>
+              <a:t>11/27/2012</a:t>
             </a:fld>
             <a:endParaRPr lang="en-US"/>
           </a:p>
@@ -1432,7 +1432,7 @@
             <a:fld id="{1D3E1B12-EC99-DD4D-B1B3-B77D5EC323E1}" type="datetime1">
               <a:rPr lang="en-US" smtClean="0"/>
               <a:pPr/>
-              <a:t>8/20/2012</a:t>
+              <a:t>11/27/2012</a:t>
             </a:fld>
             <a:endParaRPr lang="en-US"/>
           </a:p>
@@ -1715,7 +1715,7 @@
             <a:fld id="{A15A256F-5B90-4245-92C4-3E0996358E5C}" type="datetime1">
               <a:rPr lang="en-US" smtClean="0"/>
               <a:pPr/>
-              <a:t>8/20/2012</a:t>
+              <a:t>11/27/2012</a:t>
             </a:fld>
             <a:endParaRPr lang="en-US"/>
           </a:p>
@@ -2103,7 +2103,7 @@
             <a:fld id="{10A2821B-4DD2-0F4D-8A21-133DBD86BA02}" type="datetime1">
               <a:rPr lang="en-US" smtClean="0"/>
               <a:pPr/>
-              <a:t>8/20/2012</a:t>
+              <a:t>11/27/2012</a:t>
             </a:fld>
             <a:endParaRPr lang="en-US"/>
           </a:p>
@@ -2529,7 +2529,7 @@
             <a:fld id="{214B112B-C296-F345-87F5-2759BD258B4D}" type="datetime1">
               <a:rPr lang="en-US" smtClean="0"/>
               <a:pPr/>
-              <a:t>8/20/2012</a:t>
+              <a:t>11/27/2012</a:t>
             </a:fld>
             <a:endParaRPr lang="en-US"/>
           </a:p>
@@ -2551,10 +2551,10 @@
           <a:lstStyle/>
           <a:p>
             <a:r>
-              <a:rPr lang="en-US" smtClean="0"/>
+              <a:rPr lang="en-US" dirty="0" smtClean="0"/>
               <a:t>Pages you know.</a:t>
             </a:r>
-            <a:endParaRPr lang="en-US"/>
+            <a:endParaRPr lang="en-US" dirty="0"/>
           </a:p>
         </p:txBody>
       </p:sp>
@@ -3129,7 +3129,7 @@
             <a:fld id="{DC09B0C1-50D8-6B4E-B078-73F266C2F344}" type="datetime1">
               <a:rPr lang="en-US" smtClean="0"/>
               <a:pPr/>
-              <a:t>8/20/2012</a:t>
+              <a:t>11/27/2012</a:t>
             </a:fld>
             <a:endParaRPr lang="en-US"/>
           </a:p>
@@ -3557,7 +3557,7 @@
             <a:fld id="{D25D7FF9-C975-8844-AD5D-B9D608853EB8}" type="datetime1">
               <a:rPr lang="en-US" smtClean="0"/>
               <a:pPr/>
-              <a:t>8/20/2012</a:t>
+              <a:t>11/27/2012</a:t>
             </a:fld>
             <a:endParaRPr lang="en-US"/>
           </a:p>
@@ -3678,7 +3678,7 @@
             <a:fld id="{A6A3D5E4-120D-1447-A443-87F5FA017540}" type="datetime1">
               <a:rPr lang="en-US" smtClean="0"/>
               <a:pPr/>
-              <a:t>8/20/2012</a:t>
+              <a:t>11/27/2012</a:t>
             </a:fld>
             <a:endParaRPr lang="en-US"/>
           </a:p>
@@ -3774,7 +3774,7 @@
             <a:fld id="{4EB5C9DF-4929-B34E-A621-5B3F33074E66}" type="datetime1">
               <a:rPr lang="en-US" smtClean="0"/>
               <a:pPr/>
-              <a:t>8/20/2012</a:t>
+              <a:t>11/27/2012</a:t>
             </a:fld>
             <a:endParaRPr lang="en-US"/>
           </a:p>
@@ -4058,7 +4058,7 @@
             <a:fld id="{F59422E4-2DE5-B44F-B04A-4B5288EDC3DC}" type="datetime1">
               <a:rPr lang="en-US" smtClean="0"/>
               <a:pPr/>
-              <a:t>8/20/2012</a:t>
+              <a:t>11/27/2012</a:t>
             </a:fld>
             <a:endParaRPr lang="en-US"/>
           </a:p>
@@ -4335,7 +4335,7 @@
             <a:fld id="{712157B5-C1DE-C442-9F32-AC8B3B3DBDDD}" type="datetime1">
               <a:rPr lang="en-US" smtClean="0"/>
               <a:pPr/>
-              <a:t>8/20/2012</a:t>
+              <a:t>11/27/2012</a:t>
             </a:fld>
             <a:endParaRPr lang="en-US" dirty="0"/>
           </a:p>
@@ -4744,7 +4744,7 @@
             <a:fld id="{FDEDFCCF-60BF-3740-B6B6-663D67A894BB}" type="datetime1">
               <a:rPr lang="en-US" smtClean="0"/>
               <a:pPr/>
-              <a:t>8/20/2012</a:t>
+              <a:t>11/27/2012</a:t>
             </a:fld>
             <a:endParaRPr lang="en-US" dirty="0"/>
           </a:p>
@@ -4777,13 +4777,16 @@
                 <a:solidFill>
                   <a:srgbClr val="FFFFFF"/>
                 </a:solidFill>
+                <a:latin typeface="Segoe UI" pitchFamily="34" charset="0"/>
+                <a:ea typeface="Segoe UI" pitchFamily="34" charset="0"/>
+                <a:cs typeface="Segoe UI" pitchFamily="34" charset="0"/>
               </a:defRPr>
             </a:lvl1pPr>
             <a:extLst/>
           </a:lstStyle>
           <a:p>
             <a:r>
-              <a:rPr lang="en-US" smtClean="0"/>
+              <a:rPr lang="en-US" dirty="0" smtClean="0"/>
               <a:t>Pages you know.</a:t>
             </a:r>
             <a:endParaRPr lang="en-US" dirty="0"/>
@@ -5515,7 +5518,7 @@
     </p:spTree>
     <p:extLst>
       <p:ext uri="{BB962C8B-B14F-4D97-AF65-F5344CB8AC3E}">
-        <p14:creationId xmlns:p14="http://schemas.microsoft.com/office/powerpoint/2010/main" xmlns="" val="3367217013"/>
+        <p14:creationId xmlns="" xmlns:p14="http://schemas.microsoft.com/office/powerpoint/2010/main" val="3367217013"/>
       </p:ext>
     </p:extLst>
   </p:cSld>
@@ -5753,7 +5756,7 @@
             <a:fld id="{F22CE95E-7377-294A-9DD7-0645117B5595}" type="datetime1">
               <a:rPr lang="en-US" smtClean="0"/>
               <a:pPr/>
-              <a:t>8/20/2012</a:t>
+              <a:t>11/27/2012</a:t>
             </a:fld>
             <a:endParaRPr lang="en-US"/>
           </a:p>
@@ -5809,7 +5812,7 @@
     </p:spTree>
     <p:extLst>
       <p:ext uri="{BB962C8B-B14F-4D97-AF65-F5344CB8AC3E}">
-        <p14:creationId xmlns:p14="http://schemas.microsoft.com/office/powerpoint/2010/main" xmlns="" val="224190129"/>
+        <p14:creationId xmlns="" xmlns:p14="http://schemas.microsoft.com/office/powerpoint/2010/main" val="224190129"/>
       </p:ext>
     </p:extLst>
   </p:cSld>
@@ -5900,7 +5903,7 @@
             <a:fld id="{FB44CAA8-A228-C543-A92C-C08767E71049}" type="datetime1">
               <a:rPr lang="en-US" smtClean="0"/>
               <a:pPr/>
-              <a:t>8/20/2012</a:t>
+              <a:t>11/27/2012</a:t>
             </a:fld>
             <a:endParaRPr lang="en-US"/>
           </a:p>
@@ -5956,7 +5959,7 @@
     </p:spTree>
     <p:extLst>
       <p:ext uri="{BB962C8B-B14F-4D97-AF65-F5344CB8AC3E}">
-        <p14:creationId xmlns:p14="http://schemas.microsoft.com/office/powerpoint/2010/main" xmlns="" val="2821938195"/>
+        <p14:creationId xmlns="" xmlns:p14="http://schemas.microsoft.com/office/powerpoint/2010/main" val="2821938195"/>
       </p:ext>
     </p:extLst>
   </p:cSld>
@@ -6187,7 +6190,7 @@
             <a:fld id="{D72B4C5A-A4CF-3C41-90E6-A666107EB9D1}" type="datetime1">
               <a:rPr lang="en-US" smtClean="0"/>
               <a:pPr/>
-              <a:t>8/20/2012</a:t>
+              <a:t>11/27/2012</a:t>
             </a:fld>
             <a:endParaRPr lang="en-US"/>
           </a:p>
@@ -6243,7 +6246,7 @@
     </p:spTree>
     <p:extLst>
       <p:ext uri="{BB962C8B-B14F-4D97-AF65-F5344CB8AC3E}">
-        <p14:creationId xmlns:p14="http://schemas.microsoft.com/office/powerpoint/2010/main" xmlns="" val="3554415902"/>
+        <p14:creationId xmlns="" xmlns:p14="http://schemas.microsoft.com/office/powerpoint/2010/main" val="3554415902"/>
       </p:ext>
     </p:extLst>
   </p:cSld>
@@ -6294,77 +6297,19 @@
         <a:srgbClr val="663300"/>
       </a:folHlink>
     </a:clrScheme>
-    <a:fontScheme name="Module">
+    <a:fontScheme name="xlzhuathku">
       <a:majorFont>
-        <a:latin typeface="Corbel"/>
+        <a:latin typeface="Segoe UI"/>
         <a:ea typeface=""/>
         <a:cs typeface=""/>
-        <a:font script="Jpan" typeface="ＭＳ ゴシック"/>
-        <a:font script="Hang" typeface="HY엽서L"/>
-        <a:font script="Hans" typeface="华文楷体"/>
-        <a:font script="Hant" typeface="新細明體"/>
-        <a:font script="Arab" typeface="Tahoma"/>
-        <a:font script="Hebr" typeface="Miriam"/>
-        <a:font script="Thai" typeface="DilleniaUPC"/>
-        <a:font script="Ethi" typeface="Nyala"/>
-        <a:font script="Beng" typeface="Vrinda"/>
-        <a:font script="Gujr" typeface="Shruti"/>
-        <a:font script="Khmr" typeface="DaunPenh"/>
-        <a:font script="Knda" typeface="Tunga"/>
-        <a:font script="Guru" typeface="Raavi"/>
-        <a:font script="Cans" typeface="Euphemia"/>
-        <a:font script="Cher" typeface="Plantagenet Cherokee"/>
-        <a:font script="Yiii" typeface="Microsoft Yi Baiti"/>
-        <a:font script="Tibt" typeface="Microsoft Himalaya"/>
-        <a:font script="Thaa" typeface="MV Boli"/>
-        <a:font script="Deva" typeface="Mangal"/>
-        <a:font script="Telu" typeface="Gautami"/>
-        <a:font script="Taml" typeface="Latha"/>
-        <a:font script="Syrc" typeface="Estrangelo Edessa"/>
-        <a:font script="Orya" typeface="Kalinga"/>
-        <a:font script="Mlym" typeface="Kartika"/>
-        <a:font script="Laoo" typeface="DokChampa"/>
-        <a:font script="Sinh" typeface="Iskoola Pota"/>
-        <a:font script="Mong" typeface="Mongolian Baiti"/>
-        <a:font script="Viet" typeface="Arial"/>
-        <a:font script="Uigh" typeface="Microsoft Uighur"/>
       </a:majorFont>
       <a:minorFont>
-        <a:latin typeface="Corbel"/>
+        <a:latin typeface="Segoe UI"/>
         <a:ea typeface=""/>
         <a:cs typeface=""/>
-        <a:font script="Jpan" typeface="ＭＳ ゴシック"/>
-        <a:font script="Hang" typeface="HY엽서L"/>
-        <a:font script="Hans" typeface="华文楷体"/>
-        <a:font script="Hant" typeface="新細明體"/>
-        <a:font script="Arab" typeface="Tahoma"/>
-        <a:font script="Hebr" typeface="Miriam"/>
-        <a:font script="Thai" typeface="DilleniaUPC"/>
-        <a:font script="Ethi" typeface="Nyala"/>
-        <a:font script="Beng" typeface="Vrinda"/>
-        <a:font script="Gujr" typeface="Shruti"/>
-        <a:font script="Khmr" typeface="DaunPenh"/>
-        <a:font script="Knda" typeface="Tunga"/>
-        <a:font script="Guru" typeface="Raavi"/>
-        <a:font script="Cans" typeface="Euphemia"/>
-        <a:font script="Cher" typeface="Plantagenet Cherokee"/>
-        <a:font script="Yiii" typeface="Microsoft Yi Baiti"/>
-        <a:font script="Tibt" typeface="Microsoft Himalaya"/>
-        <a:font script="Thaa" typeface="MV Boli"/>
-        <a:font script="Deva" typeface="Mangal"/>
-        <a:font script="Telu" typeface="Gautami"/>
-        <a:font script="Taml" typeface="Latha"/>
-        <a:font script="Syrc" typeface="Estrangelo Edessa"/>
-        <a:font script="Orya" typeface="Kalinga"/>
-        <a:font script="Mlym" typeface="Kartika"/>
-        <a:font script="Laoo" typeface="DokChampa"/>
-        <a:font script="Sinh" typeface="Iskoola Pota"/>
-        <a:font script="Mong" typeface="Mongolian Baiti"/>
-        <a:font script="Viet" typeface="Arial"/>
-        <a:font script="Uigh" typeface="Microsoft Uighur"/>
       </a:minorFont>
     </a:fontScheme>
-    <a:fmtScheme name="Module">
+    <a:fmtScheme name="Office">
       <a:fillStyleLst>
         <a:solidFill>
           <a:schemeClr val="phClr"/>
@@ -6396,20 +6341,20 @@
           <a:gsLst>
             <a:gs pos="0">
               <a:schemeClr val="phClr">
-                <a:shade val="47500"/>
-                <a:satMod val="137000"/>
+                <a:shade val="51000"/>
+                <a:satMod val="130000"/>
               </a:schemeClr>
             </a:gs>
-            <a:gs pos="55000">
+            <a:gs pos="80000">
               <a:schemeClr val="phClr">
-                <a:shade val="69000"/>
-                <a:satMod val="137000"/>
+                <a:shade val="93000"/>
+                <a:satMod val="130000"/>
               </a:schemeClr>
             </a:gs>
             <a:gs pos="100000">
               <a:schemeClr val="phClr">
-                <a:shade val="98000"/>
-                <a:satMod val="137000"/>
+                <a:shade val="94000"/>
+                <a:satMod val="135000"/>
               </a:schemeClr>
             </a:gs>
           </a:gsLst>
@@ -6417,7 +6362,7 @@
         </a:gradFill>
       </a:fillStyleLst>
       <a:lnStyleLst>
-        <a:ln w="6350" cap="rnd" cmpd="sng" algn="ctr">
+        <a:ln w="9525" cap="flat" cmpd="sng" algn="ctr">
           <a:solidFill>
             <a:schemeClr val="phClr">
               <a:shade val="95000"/>
@@ -6426,13 +6371,13 @@
           </a:solidFill>
           <a:prstDash val="solid"/>
         </a:ln>
-        <a:ln w="48000" cap="flat" cmpd="thickThin" algn="ctr">
+        <a:ln w="25400" cap="flat" cmpd="sng" algn="ctr">
           <a:solidFill>
             <a:schemeClr val="phClr"/>
           </a:solidFill>
           <a:prstDash val="solid"/>
         </a:ln>
-        <a:ln w="48500" cap="flat" cmpd="thickThin" algn="ctr">
+        <a:ln w="38100" cap="flat" cmpd="sng" algn="ctr">
           <a:solidFill>
             <a:schemeClr val="phClr"/>
           </a:solidFill>
@@ -6442,7 +6387,7 @@
       <a:effectStyleLst>
         <a:effectStyle>
           <a:effectLst>
-            <a:outerShdw blurRad="45000" dist="25000" dir="5400000" rotWithShape="0">
+            <a:outerShdw blurRad="40000" dist="20000" dir="5400000" rotWithShape="0">
               <a:srgbClr val="000000">
                 <a:alpha val="38000"/>
               </a:srgbClr>
@@ -6451,31 +6396,31 @@
         </a:effectStyle>
         <a:effectStyle>
           <a:effectLst>
-            <a:outerShdw blurRad="39000" dist="25400" dir="5400000" rotWithShape="0">
+            <a:outerShdw blurRad="40000" dist="23000" dir="5400000" rotWithShape="0">
               <a:srgbClr val="000000">
-                <a:alpha val="38000"/>
+                <a:alpha val="35000"/>
               </a:srgbClr>
             </a:outerShdw>
           </a:effectLst>
         </a:effectStyle>
         <a:effectStyle>
           <a:effectLst>
-            <a:outerShdw blurRad="39000" dist="25400" dir="5400000" rotWithShape="0">
+            <a:outerShdw blurRad="40000" dist="23000" dir="5400000" rotWithShape="0">
               <a:srgbClr val="000000">
-                <a:alpha val="38000"/>
+                <a:alpha val="35000"/>
               </a:srgbClr>
             </a:outerShdw>
           </a:effectLst>
           <a:scene3d>
-            <a:camera prst="orthographicFront" fov="0">
+            <a:camera prst="orthographicFront">
               <a:rot lat="0" lon="0" rev="0"/>
             </a:camera>
             <a:lightRig rig="threePt" dir="t">
-              <a:rot lat="0" lon="0" rev="1800000"/>
+              <a:rot lat="0" lon="0" rev="1200000"/>
             </a:lightRig>
           </a:scene3d>
-          <a:sp3d prstMaterial="matte">
-            <a:bevelT h="20000"/>
+          <a:sp3d>
+            <a:bevelT w="63500" h="25400"/>
           </a:sp3d>
         </a:effectStyle>
       </a:effectStyleLst>

</xml_diff>

<commit_message>
update the ppt template and pdf link in cv.html
</commit_message>
<xml_diff>
--- a/files/xlzhuathku_ppt_template.pptx
+++ b/files/xlzhuathku_ppt_template.pptx
@@ -5,16 +5,14 @@
     <p:sldMasterId id="2147483789" r:id="rId1"/>
   </p:sldMasterIdLst>
   <p:notesMasterIdLst>
-    <p:notesMasterId r:id="rId6"/>
+    <p:notesMasterId r:id="rId4"/>
   </p:notesMasterIdLst>
   <p:handoutMasterIdLst>
-    <p:handoutMasterId r:id="rId7"/>
+    <p:handoutMasterId r:id="rId5"/>
   </p:handoutMasterIdLst>
   <p:sldIdLst>
     <p:sldId id="256" r:id="rId2"/>
-    <p:sldId id="257" r:id="rId3"/>
-    <p:sldId id="258" r:id="rId4"/>
-    <p:sldId id="259" r:id="rId5"/>
+    <p:sldId id="287" r:id="rId3"/>
   </p:sldIdLst>
   <p:sldSz cx="9144000" cy="6858000" type="screen4x3"/>
   <p:notesSz cx="9144000" cy="6858000"/>
@@ -199,7 +197,7 @@
             <a:fld id="{7BBE4CA1-4AF8-224A-AC3C-6A8A76475C61}" type="datetimeFigureOut">
               <a:rPr lang="en-US" smtClean="0"/>
               <a:pPr/>
-              <a:t>11/27/2012</a:t>
+              <a:t>11/18/2013</a:t>
             </a:fld>
             <a:endParaRPr lang="en-US"/>
           </a:p>
@@ -367,7 +365,7 @@
             <a:fld id="{14AE4017-4F76-8044-9AEC-004586A94155}" type="datetimeFigureOut">
               <a:rPr lang="en-US" smtClean="0"/>
               <a:pPr/>
-              <a:t>11/27/2012</a:t>
+              <a:t>11/18/2013</a:t>
             </a:fld>
             <a:endParaRPr lang="en-US"/>
           </a:p>
@@ -674,9 +672,7 @@
             <a:avLst/>
           </a:prstGeom>
           <a:solidFill>
-            <a:schemeClr val="accent3">
-              <a:lumMod val="50000"/>
-            </a:schemeClr>
+            <a:srgbClr val="009E60"/>
           </a:solidFill>
           <a:ln w="48000" cap="flat" cmpd="thickThin" algn="ctr">
             <a:noFill/>
@@ -729,9 +725,7 @@
             <a:avLst/>
           </a:prstGeom>
           <a:solidFill>
-            <a:schemeClr val="accent2">
-              <a:lumMod val="50000"/>
-            </a:schemeClr>
+            <a:srgbClr val="49C687"/>
           </a:solidFill>
           <a:ln w="48000" cap="flat" cmpd="thickThin" algn="ctr">
             <a:noFill/>
@@ -771,67 +765,6 @@
       </p:sp>
       <p:sp>
         <p:nvSpPr>
-          <p:cNvPr id="9" name="Rectangle 8"/>
-          <p:cNvSpPr/>
-          <p:nvPr/>
-        </p:nvSpPr>
-        <p:spPr bwMode="ltGray">
-          <a:xfrm>
-            <a:off x="1" y="-1"/>
-            <a:ext cx="360001" cy="166761"/>
-          </a:xfrm>
-          <a:prstGeom prst="rect">
-            <a:avLst/>
-          </a:prstGeom>
-          <a:solidFill>
-            <a:schemeClr val="accent2">
-              <a:lumMod val="75000"/>
-            </a:schemeClr>
-          </a:solidFill>
-          <a:ln w="48000" cap="flat" cmpd="thickThin" algn="ctr">
-            <a:noFill/>
-            <a:prstDash val="solid"/>
-          </a:ln>
-        </p:spPr>
-        <p:style>
-          <a:lnRef idx="2">
-            <a:schemeClr val="accent1"/>
-          </a:lnRef>
-          <a:fillRef idx="1">
-            <a:schemeClr val="accent1"/>
-          </a:fillRef>
-          <a:effectRef idx="0">
-            <a:schemeClr val="accent1"/>
-          </a:effectRef>
-          <a:fontRef idx="minor">
-            <a:schemeClr val="lt1"/>
-          </a:fontRef>
-        </p:style>
-        <p:txBody>
-          <a:bodyPr rtlCol="0" anchor="ctr"/>
-          <a:lstStyle>
-            <a:extLst/>
-          </a:lstStyle>
-          <a:p>
-            <a:pPr algn="ctr" eaLnBrk="1" latinLnBrk="0" hangingPunct="1"/>
-            <a:endParaRPr kumimoji="0" lang="en-US">
-              <a:ln>
-                <a:solidFill>
-                  <a:schemeClr val="tx2">
-                    <a:lumMod val="60000"/>
-                    <a:lumOff val="40000"/>
-                  </a:schemeClr>
-                </a:solidFill>
-              </a:ln>
-              <a:solidFill>
-                <a:srgbClr val="0AFF0A"/>
-              </a:solidFill>
-            </a:endParaRPr>
-          </a:p>
-        </p:txBody>
-      </p:sp>
-      <p:sp>
-        <p:nvSpPr>
           <p:cNvPr id="2" name="Title 1"/>
           <p:cNvSpPr>
             <a:spLocks noGrp="1"/>
@@ -863,9 +796,7 @@
             <a:lvl1pPr algn="l">
               <a:defRPr sz="4700" b="1">
                 <a:solidFill>
-                  <a:schemeClr val="tx2">
-                    <a:lumMod val="50000"/>
-                  </a:schemeClr>
+                  <a:srgbClr val="194C3E"/>
                 </a:solidFill>
               </a:defRPr>
             </a:lvl1pPr>
@@ -903,9 +834,7 @@
               <a:buNone/>
               <a:defRPr sz="2000">
                 <a:solidFill>
-                  <a:schemeClr val="accent2">
-                    <a:lumMod val="50000"/>
-                  </a:schemeClr>
+                  <a:srgbClr val="149D66"/>
                 </a:solidFill>
               </a:defRPr>
             </a:lvl1pPr>
@@ -1018,7 +947,7 @@
             <a:fld id="{31053DFE-44A7-254C-BDAC-36B719E115F1}" type="datetime1">
               <a:rPr lang="en-US" smtClean="0"/>
               <a:pPr/>
-              <a:t>11/27/2012</a:t>
+              <a:t>11/18/2013</a:t>
             </a:fld>
             <a:endParaRPr lang="en-US"/>
           </a:p>
@@ -1040,10 +969,10 @@
           <a:lstStyle/>
           <a:p>
             <a:r>
-              <a:rPr lang="en-US" smtClean="0"/>
-              <a:t>Pages you know.</a:t>
-            </a:r>
-            <a:endParaRPr lang="en-US"/>
+              <a:rPr lang="en-US" dirty="0" smtClean="0"/>
+              <a:t>For more information, please visit http://xiaolongzhu.org</a:t>
+            </a:r>
+            <a:endParaRPr lang="en-US" dirty="0"/>
           </a:p>
         </p:txBody>
       </p:sp>
@@ -1127,23 +1056,20 @@
       </p:sp>
       <p:sp>
         <p:nvSpPr>
-          <p:cNvPr id="11" name="Rectangle 10"/>
+          <p:cNvPr id="12" name="Rectangle 11"/>
           <p:cNvSpPr/>
           <p:nvPr userDrawn="1"/>
         </p:nvSpPr>
         <p:spPr bwMode="ltGray">
           <a:xfrm>
-            <a:off x="360002" y="-1"/>
-            <a:ext cx="8783998" cy="166761"/>
+            <a:off x="0" y="-2"/>
+            <a:ext cx="360001" cy="360000"/>
           </a:xfrm>
           <a:prstGeom prst="rect">
             <a:avLst/>
           </a:prstGeom>
           <a:solidFill>
-            <a:schemeClr val="accent2">
-              <a:lumMod val="20000"/>
-              <a:lumOff val="80000"/>
-            </a:schemeClr>
+            <a:srgbClr val="49C687"/>
           </a:solidFill>
           <a:ln w="48000" cap="flat" cmpd="thickThin" algn="ctr">
             <a:noFill/>
@@ -1189,84 +1115,20 @@
       </p:sp>
       <p:sp>
         <p:nvSpPr>
-          <p:cNvPr id="12" name="Rectangle 11"/>
+          <p:cNvPr id="13" name="Rectangle 12"/>
           <p:cNvSpPr/>
           <p:nvPr userDrawn="1"/>
         </p:nvSpPr>
         <p:spPr bwMode="ltGray">
           <a:xfrm>
-            <a:off x="0" y="166759"/>
-            <a:ext cx="360001" cy="551591"/>
+            <a:off x="360001" y="0"/>
+            <a:ext cx="8803418" cy="360000"/>
           </a:xfrm>
           <a:prstGeom prst="rect">
             <a:avLst/>
           </a:prstGeom>
           <a:solidFill>
-            <a:schemeClr val="accent3">
-              <a:lumMod val="75000"/>
-            </a:schemeClr>
-          </a:solidFill>
-          <a:ln w="48000" cap="flat" cmpd="thickThin" algn="ctr">
-            <a:noFill/>
-            <a:prstDash val="solid"/>
-          </a:ln>
-        </p:spPr>
-        <p:style>
-          <a:lnRef idx="2">
-            <a:schemeClr val="accent1"/>
-          </a:lnRef>
-          <a:fillRef idx="1">
-            <a:schemeClr val="accent1"/>
-          </a:fillRef>
-          <a:effectRef idx="0">
-            <a:schemeClr val="accent1"/>
-          </a:effectRef>
-          <a:fontRef idx="minor">
-            <a:schemeClr val="lt1"/>
-          </a:fontRef>
-        </p:style>
-        <p:txBody>
-          <a:bodyPr rtlCol="0" anchor="ctr"/>
-          <a:lstStyle>
-            <a:extLst/>
-          </a:lstStyle>
-          <a:p>
-            <a:pPr algn="ctr" eaLnBrk="1" latinLnBrk="0" hangingPunct="1"/>
-            <a:endParaRPr kumimoji="0" lang="en-US">
-              <a:ln>
-                <a:solidFill>
-                  <a:schemeClr val="tx2">
-                    <a:lumMod val="60000"/>
-                    <a:lumOff val="40000"/>
-                  </a:schemeClr>
-                </a:solidFill>
-              </a:ln>
-              <a:solidFill>
-                <a:srgbClr val="0AFF0A"/>
-              </a:solidFill>
-            </a:endParaRPr>
-          </a:p>
-        </p:txBody>
-      </p:sp>
-      <p:sp>
-        <p:nvSpPr>
-          <p:cNvPr id="13" name="Rectangle 12"/>
-          <p:cNvSpPr/>
-          <p:nvPr userDrawn="1"/>
-        </p:nvSpPr>
-        <p:spPr bwMode="ltGray">
-          <a:xfrm>
-            <a:off x="360001" y="166760"/>
-            <a:ext cx="8783998" cy="551589"/>
-          </a:xfrm>
-          <a:prstGeom prst="rect">
-            <a:avLst/>
-          </a:prstGeom>
-          <a:solidFill>
-            <a:schemeClr val="accent3">
-              <a:lumMod val="20000"/>
-              <a:lumOff val="80000"/>
-            </a:schemeClr>
+            <a:srgbClr val="009E60"/>
           </a:solidFill>
           <a:ln w="48000" cap="flat" cmpd="thickThin" algn="ctr">
             <a:noFill/>
@@ -1432,7 +1294,7 @@
             <a:fld id="{1D3E1B12-EC99-DD4D-B1B3-B77D5EC323E1}" type="datetime1">
               <a:rPr lang="en-US" smtClean="0"/>
               <a:pPr/>
-              <a:t>11/27/2012</a:t>
+              <a:t>11/18/2013</a:t>
             </a:fld>
             <a:endParaRPr lang="en-US"/>
           </a:p>
@@ -1454,10 +1316,10 @@
           <a:lstStyle/>
           <a:p>
             <a:r>
-              <a:rPr lang="en-US" smtClean="0"/>
-              <a:t>Pages you know.</a:t>
-            </a:r>
-            <a:endParaRPr lang="en-US"/>
+              <a:rPr lang="en-US" dirty="0" smtClean="0"/>
+              <a:t>For more information, please visit http://xiaolongzhu.org</a:t>
+            </a:r>
+            <a:endParaRPr lang="en-US" dirty="0"/>
           </a:p>
         </p:txBody>
       </p:sp>
@@ -1525,9 +1387,7 @@
             <a:avLst/>
           </a:prstGeom>
           <a:solidFill>
-            <a:schemeClr val="bg2">
-              <a:lumMod val="50000"/>
-            </a:schemeClr>
+            <a:srgbClr val="009E60"/>
           </a:solidFill>
           <a:ln w="48000" cap="flat" cmpd="thickThin" algn="ctr">
             <a:noFill/>
@@ -1574,9 +1434,7 @@
             <a:avLst/>
           </a:prstGeom>
           <a:solidFill>
-            <a:schemeClr val="bg2">
-              <a:lumMod val="10000"/>
-            </a:schemeClr>
+            <a:srgbClr val="4DC780"/>
           </a:solidFill>
           <a:ln w="48000" cap="flat" cmpd="thickThin" algn="ctr">
             <a:noFill/>
@@ -1621,7 +1479,7 @@
         <p:spPr>
           <a:xfrm>
             <a:off x="6781800" y="274640"/>
-            <a:ext cx="1905000" cy="5851525"/>
+            <a:ext cx="1905000" cy="6252914"/>
           </a:xfrm>
         </p:spPr>
         <p:txBody>
@@ -1715,7 +1573,7 @@
             <a:fld id="{A15A256F-5B90-4245-92C4-3E0996358E5C}" type="datetime1">
               <a:rPr lang="en-US" smtClean="0"/>
               <a:pPr/>
-              <a:t>11/27/2012</a:t>
+              <a:t>11/18/2013</a:t>
             </a:fld>
             <a:endParaRPr lang="en-US"/>
           </a:p>
@@ -1775,204 +1633,6 @@
               <a:t>‹#›</a:t>
             </a:fld>
             <a:endParaRPr lang="en-US" dirty="0"/>
-          </a:p>
-        </p:txBody>
-      </p:sp>
-      <p:sp>
-        <p:nvSpPr>
-          <p:cNvPr id="13" name="Rectangle 12"/>
-          <p:cNvSpPr/>
-          <p:nvPr userDrawn="1"/>
-        </p:nvSpPr>
-        <p:spPr bwMode="ltGray">
-          <a:xfrm flipH="1">
-            <a:off x="6768970" y="274640"/>
-            <a:ext cx="45719" cy="6583360"/>
-          </a:xfrm>
-          <a:prstGeom prst="rect">
-            <a:avLst/>
-          </a:prstGeom>
-          <a:solidFill>
-            <a:schemeClr val="accent2">
-              <a:lumMod val="40000"/>
-              <a:lumOff val="60000"/>
-            </a:schemeClr>
-          </a:solidFill>
-          <a:ln w="48000" cap="flat" cmpd="thickThin" algn="ctr">
-            <a:noFill/>
-            <a:prstDash val="solid"/>
-          </a:ln>
-        </p:spPr>
-        <p:style>
-          <a:lnRef idx="2">
-            <a:schemeClr val="accent1"/>
-          </a:lnRef>
-          <a:fillRef idx="1">
-            <a:schemeClr val="accent1"/>
-          </a:fillRef>
-          <a:effectRef idx="0">
-            <a:schemeClr val="accent1"/>
-          </a:effectRef>
-          <a:fontRef idx="minor">
-            <a:schemeClr val="lt1"/>
-          </a:fontRef>
-        </p:style>
-        <p:txBody>
-          <a:bodyPr rtlCol="0" anchor="ctr"/>
-          <a:lstStyle>
-            <a:extLst/>
-          </a:lstStyle>
-          <a:p>
-            <a:pPr algn="ctr" eaLnBrk="1" latinLnBrk="0" hangingPunct="1"/>
-            <a:endParaRPr kumimoji="0" lang="en-US"/>
-          </a:p>
-        </p:txBody>
-      </p:sp>
-      <p:sp>
-        <p:nvSpPr>
-          <p:cNvPr id="14" name="Rectangle 13"/>
-          <p:cNvSpPr/>
-          <p:nvPr userDrawn="1"/>
-        </p:nvSpPr>
-        <p:spPr bwMode="ltGray">
-          <a:xfrm flipH="1" flipV="1">
-            <a:off x="6770101" y="0"/>
-            <a:ext cx="45719" cy="274640"/>
-          </a:xfrm>
-          <a:prstGeom prst="rect">
-            <a:avLst/>
-          </a:prstGeom>
-          <a:solidFill>
-            <a:schemeClr val="accent2">
-              <a:lumMod val="50000"/>
-            </a:schemeClr>
-          </a:solidFill>
-          <a:ln w="48000" cap="flat" cmpd="thickThin" algn="ctr">
-            <a:noFill/>
-            <a:prstDash val="solid"/>
-          </a:ln>
-        </p:spPr>
-        <p:style>
-          <a:lnRef idx="2">
-            <a:schemeClr val="accent1"/>
-          </a:lnRef>
-          <a:fillRef idx="1">
-            <a:schemeClr val="accent1"/>
-          </a:fillRef>
-          <a:effectRef idx="0">
-            <a:schemeClr val="accent1"/>
-          </a:effectRef>
-          <a:fontRef idx="minor">
-            <a:schemeClr val="lt1"/>
-          </a:fontRef>
-        </p:style>
-        <p:txBody>
-          <a:bodyPr rtlCol="0" anchor="ctr"/>
-          <a:lstStyle>
-            <a:extLst/>
-          </a:lstStyle>
-          <a:p>
-            <a:pPr algn="ctr" eaLnBrk="1" latinLnBrk="0" hangingPunct="1"/>
-            <a:endParaRPr kumimoji="0" lang="en-US"/>
-          </a:p>
-        </p:txBody>
-      </p:sp>
-      <p:sp>
-        <p:nvSpPr>
-          <p:cNvPr id="15" name="Rectangle 14"/>
-          <p:cNvSpPr/>
-          <p:nvPr userDrawn="1"/>
-        </p:nvSpPr>
-        <p:spPr bwMode="ltGray">
-          <a:xfrm>
-            <a:off x="6671174" y="274640"/>
-            <a:ext cx="102633" cy="6583360"/>
-          </a:xfrm>
-          <a:prstGeom prst="rect">
-            <a:avLst/>
-          </a:prstGeom>
-          <a:solidFill>
-            <a:schemeClr val="accent3">
-              <a:lumMod val="40000"/>
-              <a:lumOff val="60000"/>
-            </a:schemeClr>
-          </a:solidFill>
-          <a:ln w="48000" cap="flat" cmpd="thickThin" algn="ctr">
-            <a:noFill/>
-            <a:prstDash val="solid"/>
-          </a:ln>
-        </p:spPr>
-        <p:style>
-          <a:lnRef idx="2">
-            <a:schemeClr val="accent1"/>
-          </a:lnRef>
-          <a:fillRef idx="1">
-            <a:schemeClr val="accent1"/>
-          </a:fillRef>
-          <a:effectRef idx="0">
-            <a:schemeClr val="accent1"/>
-          </a:effectRef>
-          <a:fontRef idx="minor">
-            <a:schemeClr val="lt1"/>
-          </a:fontRef>
-        </p:style>
-        <p:txBody>
-          <a:bodyPr rtlCol="0" anchor="ctr"/>
-          <a:lstStyle>
-            <a:extLst/>
-          </a:lstStyle>
-          <a:p>
-            <a:pPr algn="ctr" eaLnBrk="1" latinLnBrk="0" hangingPunct="1"/>
-            <a:endParaRPr kumimoji="0" lang="en-US"/>
-          </a:p>
-        </p:txBody>
-      </p:sp>
-      <p:sp>
-        <p:nvSpPr>
-          <p:cNvPr id="16" name="Rectangle 15"/>
-          <p:cNvSpPr/>
-          <p:nvPr userDrawn="1"/>
-        </p:nvSpPr>
-        <p:spPr bwMode="ltGray">
-          <a:xfrm flipV="1">
-            <a:off x="6672305" y="0"/>
-            <a:ext cx="102633" cy="274640"/>
-          </a:xfrm>
-          <a:prstGeom prst="rect">
-            <a:avLst/>
-          </a:prstGeom>
-          <a:solidFill>
-            <a:schemeClr val="accent3">
-              <a:lumMod val="50000"/>
-            </a:schemeClr>
-          </a:solidFill>
-          <a:ln w="48000" cap="flat" cmpd="thickThin" algn="ctr">
-            <a:noFill/>
-            <a:prstDash val="solid"/>
-          </a:ln>
-        </p:spPr>
-        <p:style>
-          <a:lnRef idx="2">
-            <a:schemeClr val="accent1"/>
-          </a:lnRef>
-          <a:fillRef idx="1">
-            <a:schemeClr val="accent1"/>
-          </a:fillRef>
-          <a:effectRef idx="0">
-            <a:schemeClr val="accent1"/>
-          </a:effectRef>
-          <a:fontRef idx="minor">
-            <a:schemeClr val="lt1"/>
-          </a:fontRef>
-        </p:style>
-        <p:txBody>
-          <a:bodyPr rtlCol="0" anchor="ctr"/>
-          <a:lstStyle>
-            <a:extLst/>
-          </a:lstStyle>
-          <a:p>
-            <a:pPr algn="ctr" eaLnBrk="1" latinLnBrk="0" hangingPunct="1"/>
-            <a:endParaRPr kumimoji="0" lang="en-US"/>
           </a:p>
         </p:txBody>
       </p:sp>
@@ -2013,8 +1673,8 @@
         </p:nvSpPr>
         <p:spPr>
           <a:xfrm>
-            <a:off x="1847403" y="0"/>
-            <a:ext cx="6956017" cy="692694"/>
+            <a:off x="360001" y="0"/>
+            <a:ext cx="8443420" cy="692694"/>
           </a:xfrm>
         </p:spPr>
         <p:txBody>
@@ -2045,6 +1705,38 @@
         <p:txBody>
           <a:bodyPr/>
           <a:lstStyle>
+            <a:lvl1pPr marL="438912" indent="-320040">
+              <a:buClr>
+                <a:srgbClr val="194C3E"/>
+              </a:buClr>
+              <a:buFont typeface="Wingdings 2" charset="2"/>
+              <a:buChar char=""/>
+              <a:defRPr/>
+            </a:lvl1pPr>
+            <a:lvl2pPr>
+              <a:buClr>
+                <a:srgbClr val="149D66"/>
+              </a:buClr>
+              <a:defRPr/>
+            </a:lvl2pPr>
+            <a:lvl3pPr>
+              <a:buClr>
+                <a:srgbClr val="4DC780"/>
+              </a:buClr>
+              <a:defRPr/>
+            </a:lvl3pPr>
+            <a:lvl4pPr>
+              <a:buClr>
+                <a:srgbClr val="194C3E"/>
+              </a:buClr>
+              <a:defRPr/>
+            </a:lvl4pPr>
+            <a:lvl5pPr>
+              <a:buClr>
+                <a:srgbClr val="149D66"/>
+              </a:buClr>
+              <a:defRPr/>
+            </a:lvl5pPr>
             <a:extLst/>
           </a:lstStyle>
           <a:p>
@@ -2103,7 +1795,7 @@
             <a:fld id="{10A2821B-4DD2-0F4D-8A21-133DBD86BA02}" type="datetime1">
               <a:rPr lang="en-US" smtClean="0"/>
               <a:pPr/>
-              <a:t>11/27/2012</a:t>
+              <a:t>11/18/2013</a:t>
             </a:fld>
             <a:endParaRPr lang="en-US"/>
           </a:p>
@@ -2125,8 +1817,8 @@
           <a:lstStyle/>
           <a:p>
             <a:r>
-              <a:rPr lang="en-US" smtClean="0"/>
-              <a:t>Pages you know.</a:t>
+              <a:rPr lang="en-US" dirty="0" smtClean="0"/>
+              <a:t>For more information, please visit http://xiaolongzhu.org</a:t>
             </a:r>
             <a:endParaRPr lang="en-US" dirty="0"/>
           </a:p>
@@ -2188,7 +1880,7 @@
       </p:grpSpPr>
       <p:sp>
         <p:nvSpPr>
-          <p:cNvPr id="14" name="Rectangle 13"/>
+          <p:cNvPr id="20" name="Rectangle 19"/>
           <p:cNvSpPr/>
           <p:nvPr userDrawn="1"/>
         </p:nvSpPr>
@@ -2201,9 +1893,7 @@
             <a:avLst/>
           </a:prstGeom>
           <a:solidFill>
-            <a:schemeClr val="accent3">
-              <a:lumMod val="50000"/>
-            </a:schemeClr>
+            <a:srgbClr val="149D66"/>
           </a:solidFill>
           <a:ln w="48000" cap="flat" cmpd="thickThin" algn="ctr">
             <a:noFill/>
@@ -2243,7 +1933,7 @@
       </p:sp>
       <p:sp>
         <p:nvSpPr>
-          <p:cNvPr id="15" name="Rectangle 14"/>
+          <p:cNvPr id="21" name="Rectangle 20"/>
           <p:cNvSpPr/>
           <p:nvPr userDrawn="1"/>
         </p:nvSpPr>
@@ -2256,9 +1946,7 @@
             <a:avLst/>
           </a:prstGeom>
           <a:solidFill>
-            <a:schemeClr val="accent2">
-              <a:lumMod val="50000"/>
-            </a:schemeClr>
+            <a:srgbClr val="49C687"/>
           </a:solidFill>
           <a:ln w="48000" cap="flat" cmpd="thickThin" algn="ctr">
             <a:noFill/>
@@ -2298,22 +1986,20 @@
       </p:sp>
       <p:sp>
         <p:nvSpPr>
-          <p:cNvPr id="9" name="Rectangle 8"/>
+          <p:cNvPr id="18" name="Rectangle 17"/>
           <p:cNvSpPr/>
-          <p:nvPr/>
+          <p:nvPr userDrawn="1"/>
         </p:nvSpPr>
         <p:spPr bwMode="ltGray">
           <a:xfrm>
-            <a:off x="360000" y="1"/>
-            <a:ext cx="8783999" cy="2435759"/>
+            <a:off x="359999" y="2"/>
+            <a:ext cx="8803419" cy="2160000"/>
           </a:xfrm>
           <a:prstGeom prst="rect">
             <a:avLst/>
           </a:prstGeom>
           <a:solidFill>
-            <a:schemeClr val="bg2">
-              <a:lumMod val="50000"/>
-            </a:schemeClr>
+            <a:srgbClr val="009E60"/>
           </a:solidFill>
           <a:ln w="48000" cap="flat" cmpd="thickThin" algn="ctr">
             <a:noFill/>
@@ -2340,8 +2026,67 @@
             <a:extLst/>
           </a:lstStyle>
           <a:p>
-            <a:pPr algn="ctr" eaLnBrk="1" latinLnBrk="0" hangingPunct="1"/>
-            <a:endParaRPr kumimoji="0" lang="en-US"/>
+            <a:pPr algn="r" eaLnBrk="1" latinLnBrk="0" hangingPunct="1"/>
+            <a:endParaRPr kumimoji="0" lang="en-US" dirty="0">
+              <a:solidFill>
+                <a:schemeClr val="accent2">
+                  <a:lumMod val="75000"/>
+                </a:schemeClr>
+              </a:solidFill>
+            </a:endParaRPr>
+          </a:p>
+        </p:txBody>
+      </p:sp>
+      <p:sp>
+        <p:nvSpPr>
+          <p:cNvPr id="19" name="Rectangle 18"/>
+          <p:cNvSpPr/>
+          <p:nvPr userDrawn="1"/>
+        </p:nvSpPr>
+        <p:spPr bwMode="ltGray">
+          <a:xfrm>
+            <a:off x="1" y="5"/>
+            <a:ext cx="360000" cy="2160000"/>
+          </a:xfrm>
+          <a:prstGeom prst="rect">
+            <a:avLst/>
+          </a:prstGeom>
+          <a:solidFill>
+            <a:srgbClr val="4DC780"/>
+          </a:solidFill>
+          <a:ln w="48000" cap="flat" cmpd="thickThin" algn="ctr">
+            <a:noFill/>
+            <a:prstDash val="solid"/>
+          </a:ln>
+        </p:spPr>
+        <p:style>
+          <a:lnRef idx="2">
+            <a:schemeClr val="accent1"/>
+          </a:lnRef>
+          <a:fillRef idx="1">
+            <a:schemeClr val="accent1"/>
+          </a:fillRef>
+          <a:effectRef idx="0">
+            <a:schemeClr val="accent1"/>
+          </a:effectRef>
+          <a:fontRef idx="minor">
+            <a:schemeClr val="lt1"/>
+          </a:fontRef>
+        </p:style>
+        <p:txBody>
+          <a:bodyPr rtlCol="0" anchor="ctr"/>
+          <a:lstStyle>
+            <a:extLst/>
+          </a:lstStyle>
+          <a:p>
+            <a:pPr algn="r" eaLnBrk="1" latinLnBrk="0" hangingPunct="1"/>
+            <a:endParaRPr kumimoji="0" lang="en-US" dirty="0">
+              <a:solidFill>
+                <a:schemeClr val="accent2">
+                  <a:lumMod val="75000"/>
+                </a:schemeClr>
+              </a:solidFill>
+            </a:endParaRPr>
           </a:p>
         </p:txBody>
       </p:sp>
@@ -2357,8 +2102,8 @@
         </p:nvSpPr>
         <p:spPr>
           <a:xfrm>
-            <a:off x="360001" y="1"/>
-            <a:ext cx="8402999" cy="1755647"/>
+            <a:off x="360001" y="2"/>
+            <a:ext cx="8402999" cy="1536780"/>
           </a:xfrm>
         </p:spPr>
         <p:txBody>
@@ -2405,7 +2150,7 @@
         </p:nvSpPr>
         <p:spPr>
           <a:xfrm>
-            <a:off x="360001" y="1755648"/>
+            <a:off x="359999" y="1536782"/>
             <a:ext cx="8402999" cy="634393"/>
           </a:xfrm>
         </p:spPr>
@@ -2529,7 +2274,7 @@
             <a:fld id="{214B112B-C296-F345-87F5-2759BD258B4D}" type="datetime1">
               <a:rPr lang="en-US" smtClean="0"/>
               <a:pPr/>
-              <a:t>11/27/2012</a:t>
+              <a:t>11/18/2013</a:t>
             </a:fld>
             <a:endParaRPr lang="en-US"/>
           </a:p>
@@ -2552,7 +2297,7 @@
           <a:p>
             <a:r>
               <a:rPr lang="en-US" dirty="0" smtClean="0"/>
-              <a:t>Pages you know.</a:t>
+              <a:t>For more information, please visit http://xiaolongzhu.org</a:t>
             </a:r>
             <a:endParaRPr lang="en-US" dirty="0"/>
           </a:p>
@@ -2579,313 +2324,6 @@
               <a:t>‹#›</a:t>
             </a:fld>
             <a:endParaRPr lang="en-US"/>
-          </a:p>
-        </p:txBody>
-      </p:sp>
-      <p:sp>
-        <p:nvSpPr>
-          <p:cNvPr id="10" name="Rectangle 9"/>
-          <p:cNvSpPr/>
-          <p:nvPr userDrawn="1"/>
-        </p:nvSpPr>
-        <p:spPr bwMode="ltGray">
-          <a:xfrm>
-            <a:off x="1" y="2435759"/>
-            <a:ext cx="360001" cy="166761"/>
-          </a:xfrm>
-          <a:prstGeom prst="rect">
-            <a:avLst/>
-          </a:prstGeom>
-          <a:solidFill>
-            <a:schemeClr val="accent3">
-              <a:lumMod val="50000"/>
-            </a:schemeClr>
-          </a:solidFill>
-          <a:ln w="48000" cap="flat" cmpd="thickThin" algn="ctr">
-            <a:noFill/>
-            <a:prstDash val="solid"/>
-          </a:ln>
-        </p:spPr>
-        <p:style>
-          <a:lnRef idx="2">
-            <a:schemeClr val="accent1"/>
-          </a:lnRef>
-          <a:fillRef idx="1">
-            <a:schemeClr val="accent1"/>
-          </a:fillRef>
-          <a:effectRef idx="0">
-            <a:schemeClr val="accent1"/>
-          </a:effectRef>
-          <a:fontRef idx="minor">
-            <a:schemeClr val="lt1"/>
-          </a:fontRef>
-        </p:style>
-        <p:txBody>
-          <a:bodyPr rtlCol="0" anchor="ctr"/>
-          <a:lstStyle>
-            <a:extLst/>
-          </a:lstStyle>
-          <a:p>
-            <a:pPr algn="ctr" eaLnBrk="1" latinLnBrk="0" hangingPunct="1"/>
-            <a:endParaRPr kumimoji="0" lang="en-US">
-              <a:ln>
-                <a:solidFill>
-                  <a:schemeClr val="tx2">
-                    <a:lumMod val="60000"/>
-                    <a:lumOff val="40000"/>
-                  </a:schemeClr>
-                </a:solidFill>
-              </a:ln>
-              <a:solidFill>
-                <a:srgbClr val="0AFF0A"/>
-              </a:solidFill>
-            </a:endParaRPr>
-          </a:p>
-        </p:txBody>
-      </p:sp>
-      <p:sp>
-        <p:nvSpPr>
-          <p:cNvPr id="11" name="Rectangle 10"/>
-          <p:cNvSpPr/>
-          <p:nvPr userDrawn="1"/>
-        </p:nvSpPr>
-        <p:spPr bwMode="ltGray">
-          <a:xfrm>
-            <a:off x="360002" y="2435759"/>
-            <a:ext cx="8783998" cy="166761"/>
-          </a:xfrm>
-          <a:prstGeom prst="rect">
-            <a:avLst/>
-          </a:prstGeom>
-          <a:solidFill>
-            <a:schemeClr val="accent3">
-              <a:lumMod val="40000"/>
-              <a:lumOff val="60000"/>
-            </a:schemeClr>
-          </a:solidFill>
-          <a:ln w="48000" cap="flat" cmpd="thickThin" algn="ctr">
-            <a:noFill/>
-            <a:prstDash val="solid"/>
-          </a:ln>
-        </p:spPr>
-        <p:style>
-          <a:lnRef idx="2">
-            <a:schemeClr val="accent1"/>
-          </a:lnRef>
-          <a:fillRef idx="1">
-            <a:schemeClr val="accent1"/>
-          </a:fillRef>
-          <a:effectRef idx="0">
-            <a:schemeClr val="accent1"/>
-          </a:effectRef>
-          <a:fontRef idx="minor">
-            <a:schemeClr val="lt1"/>
-          </a:fontRef>
-        </p:style>
-        <p:txBody>
-          <a:bodyPr rtlCol="0" anchor="ctr"/>
-          <a:lstStyle>
-            <a:extLst/>
-          </a:lstStyle>
-          <a:p>
-            <a:pPr algn="ctr" eaLnBrk="1" latinLnBrk="0" hangingPunct="1"/>
-            <a:endParaRPr kumimoji="0" lang="en-US">
-              <a:ln>
-                <a:solidFill>
-                  <a:schemeClr val="tx2">
-                    <a:lumMod val="60000"/>
-                    <a:lumOff val="40000"/>
-                  </a:schemeClr>
-                </a:solidFill>
-              </a:ln>
-              <a:solidFill>
-                <a:srgbClr val="0AFF0A"/>
-              </a:solidFill>
-            </a:endParaRPr>
-          </a:p>
-        </p:txBody>
-      </p:sp>
-      <p:sp>
-        <p:nvSpPr>
-          <p:cNvPr id="13" name="Rectangle 12"/>
-          <p:cNvSpPr/>
-          <p:nvPr userDrawn="1"/>
-        </p:nvSpPr>
-        <p:spPr bwMode="ltGray">
-          <a:xfrm>
-            <a:off x="-1547" y="2"/>
-            <a:ext cx="360001" cy="2435758"/>
-          </a:xfrm>
-          <a:prstGeom prst="rect">
-            <a:avLst/>
-          </a:prstGeom>
-          <a:solidFill>
-            <a:schemeClr val="bg2">
-              <a:lumMod val="10000"/>
-            </a:schemeClr>
-          </a:solidFill>
-          <a:ln w="48000" cap="flat" cmpd="thickThin" algn="ctr">
-            <a:noFill/>
-            <a:prstDash val="solid"/>
-          </a:ln>
-        </p:spPr>
-        <p:style>
-          <a:lnRef idx="2">
-            <a:schemeClr val="accent1"/>
-          </a:lnRef>
-          <a:fillRef idx="1">
-            <a:schemeClr val="accent1"/>
-          </a:fillRef>
-          <a:effectRef idx="0">
-            <a:schemeClr val="accent1"/>
-          </a:effectRef>
-          <a:fontRef idx="minor">
-            <a:schemeClr val="lt1"/>
-          </a:fontRef>
-        </p:style>
-        <p:txBody>
-          <a:bodyPr rtlCol="0" anchor="ctr"/>
-          <a:lstStyle>
-            <a:extLst/>
-          </a:lstStyle>
-          <a:p>
-            <a:pPr algn="ctr" eaLnBrk="1" latinLnBrk="0" hangingPunct="1"/>
-            <a:endParaRPr kumimoji="0" lang="en-US">
-              <a:ln>
-                <a:solidFill>
-                  <a:schemeClr val="tx2">
-                    <a:lumMod val="60000"/>
-                    <a:lumOff val="40000"/>
-                  </a:schemeClr>
-                </a:solidFill>
-              </a:ln>
-              <a:solidFill>
-                <a:srgbClr val="0AFF0A"/>
-              </a:solidFill>
-            </a:endParaRPr>
-          </a:p>
-        </p:txBody>
-      </p:sp>
-      <p:sp>
-        <p:nvSpPr>
-          <p:cNvPr id="16" name="Rectangle 15"/>
-          <p:cNvSpPr/>
-          <p:nvPr userDrawn="1"/>
-        </p:nvSpPr>
-        <p:spPr bwMode="ltGray">
-          <a:xfrm>
-            <a:off x="-1547" y="2390041"/>
-            <a:ext cx="360001" cy="45719"/>
-          </a:xfrm>
-          <a:prstGeom prst="rect">
-            <a:avLst/>
-          </a:prstGeom>
-          <a:solidFill>
-            <a:schemeClr val="accent2">
-              <a:lumMod val="50000"/>
-            </a:schemeClr>
-          </a:solidFill>
-          <a:ln w="48000" cap="flat" cmpd="thickThin" algn="ctr">
-            <a:noFill/>
-            <a:prstDash val="solid"/>
-          </a:ln>
-        </p:spPr>
-        <p:style>
-          <a:lnRef idx="2">
-            <a:schemeClr val="accent1"/>
-          </a:lnRef>
-          <a:fillRef idx="1">
-            <a:schemeClr val="accent1"/>
-          </a:fillRef>
-          <a:effectRef idx="0">
-            <a:schemeClr val="accent1"/>
-          </a:effectRef>
-          <a:fontRef idx="minor">
-            <a:schemeClr val="lt1"/>
-          </a:fontRef>
-        </p:style>
-        <p:txBody>
-          <a:bodyPr rtlCol="0" anchor="ctr"/>
-          <a:lstStyle>
-            <a:extLst/>
-          </a:lstStyle>
-          <a:p>
-            <a:pPr algn="ctr" eaLnBrk="1" latinLnBrk="0" hangingPunct="1"/>
-            <a:endParaRPr kumimoji="0" lang="en-US">
-              <a:ln>
-                <a:solidFill>
-                  <a:schemeClr val="tx2">
-                    <a:lumMod val="60000"/>
-                    <a:lumOff val="40000"/>
-                  </a:schemeClr>
-                </a:solidFill>
-              </a:ln>
-              <a:solidFill>
-                <a:srgbClr val="0AFF0A"/>
-              </a:solidFill>
-            </a:endParaRPr>
-          </a:p>
-        </p:txBody>
-      </p:sp>
-      <p:sp>
-        <p:nvSpPr>
-          <p:cNvPr id="17" name="Rectangle 16"/>
-          <p:cNvSpPr/>
-          <p:nvPr userDrawn="1"/>
-        </p:nvSpPr>
-        <p:spPr bwMode="ltGray">
-          <a:xfrm>
-            <a:off x="358454" y="2390041"/>
-            <a:ext cx="8783998" cy="45719"/>
-          </a:xfrm>
-          <a:prstGeom prst="rect">
-            <a:avLst/>
-          </a:prstGeom>
-          <a:solidFill>
-            <a:schemeClr val="accent2">
-              <a:lumMod val="40000"/>
-              <a:lumOff val="60000"/>
-            </a:schemeClr>
-          </a:solidFill>
-          <a:ln w="48000" cap="flat" cmpd="thickThin" algn="ctr">
-            <a:noFill/>
-            <a:prstDash val="solid"/>
-          </a:ln>
-        </p:spPr>
-        <p:style>
-          <a:lnRef idx="2">
-            <a:schemeClr val="accent1"/>
-          </a:lnRef>
-          <a:fillRef idx="1">
-            <a:schemeClr val="accent1"/>
-          </a:fillRef>
-          <a:effectRef idx="0">
-            <a:schemeClr val="accent1"/>
-          </a:effectRef>
-          <a:fontRef idx="minor">
-            <a:schemeClr val="lt1"/>
-          </a:fontRef>
-        </p:style>
-        <p:txBody>
-          <a:bodyPr rtlCol="0" anchor="ctr"/>
-          <a:lstStyle>
-            <a:extLst/>
-          </a:lstStyle>
-          <a:p>
-            <a:pPr algn="ctr" eaLnBrk="1" latinLnBrk="0" hangingPunct="1"/>
-            <a:endParaRPr kumimoji="0" lang="en-US">
-              <a:ln>
-                <a:solidFill>
-                  <a:schemeClr val="tx2">
-                    <a:lumMod val="60000"/>
-                    <a:lumOff val="40000"/>
-                  </a:schemeClr>
-                </a:solidFill>
-              </a:ln>
-              <a:solidFill>
-                <a:srgbClr val="0AFF0A"/>
-              </a:solidFill>
-            </a:endParaRPr>
           </a:p>
         </p:txBody>
       </p:sp>
@@ -3129,7 +2567,7 @@
             <a:fld id="{DC09B0C1-50D8-6B4E-B078-73F266C2F344}" type="datetime1">
               <a:rPr lang="en-US" smtClean="0"/>
               <a:pPr/>
-              <a:t>11/27/2012</a:t>
+              <a:t>11/18/2013</a:t>
             </a:fld>
             <a:endParaRPr lang="en-US"/>
           </a:p>
@@ -3151,10 +2589,10 @@
           <a:lstStyle/>
           <a:p>
             <a:r>
-              <a:rPr lang="en-US" smtClean="0"/>
-              <a:t>Pages you know.</a:t>
-            </a:r>
-            <a:endParaRPr lang="en-US"/>
+              <a:rPr lang="en-US" dirty="0" smtClean="0"/>
+              <a:t>For more information, please visit http://xiaolongzhu.org</a:t>
+            </a:r>
+            <a:endParaRPr lang="en-US" dirty="0"/>
           </a:p>
         </p:txBody>
       </p:sp>
@@ -3557,7 +2995,7 @@
             <a:fld id="{D25D7FF9-C975-8844-AD5D-B9D608853EB8}" type="datetime1">
               <a:rPr lang="en-US" smtClean="0"/>
               <a:pPr/>
-              <a:t>11/27/2012</a:t>
+              <a:t>11/18/2013</a:t>
             </a:fld>
             <a:endParaRPr lang="en-US"/>
           </a:p>
@@ -3579,10 +3017,10 @@
           <a:lstStyle/>
           <a:p>
             <a:r>
-              <a:rPr lang="en-US" smtClean="0"/>
-              <a:t>Pages you know.</a:t>
-            </a:r>
-            <a:endParaRPr lang="en-US"/>
+              <a:rPr lang="en-US" dirty="0" smtClean="0"/>
+              <a:t>For more information, please visit http://xiaolongzhu.org</a:t>
+            </a:r>
+            <a:endParaRPr lang="en-US" dirty="0"/>
           </a:p>
         </p:txBody>
       </p:sp>
@@ -3678,7 +3116,7 @@
             <a:fld id="{A6A3D5E4-120D-1447-A443-87F5FA017540}" type="datetime1">
               <a:rPr lang="en-US" smtClean="0"/>
               <a:pPr/>
-              <a:t>11/27/2012</a:t>
+              <a:t>11/18/2013</a:t>
             </a:fld>
             <a:endParaRPr lang="en-US"/>
           </a:p>
@@ -3697,13 +3135,17 @@
         <p:spPr/>
         <p:txBody>
           <a:bodyPr/>
-          <a:lstStyle/>
-          <a:p>
-            <a:r>
-              <a:rPr lang="en-US" smtClean="0"/>
-              <a:t>Pages you know.</a:t>
-            </a:r>
-            <a:endParaRPr lang="en-US"/>
+          <a:lstStyle>
+            <a:lvl1pPr>
+              <a:defRPr/>
+            </a:lvl1pPr>
+          </a:lstStyle>
+          <a:p>
+            <a:r>
+              <a:rPr lang="en-US" dirty="0" smtClean="0"/>
+              <a:t>For more information, please visit http://xiaolongzhu.org</a:t>
+            </a:r>
+            <a:endParaRPr lang="en-US" dirty="0"/>
           </a:p>
         </p:txBody>
       </p:sp>
@@ -3774,7 +3216,7 @@
             <a:fld id="{4EB5C9DF-4929-B34E-A621-5B3F33074E66}" type="datetime1">
               <a:rPr lang="en-US" smtClean="0"/>
               <a:pPr/>
-              <a:t>11/27/2012</a:t>
+              <a:t>11/18/2013</a:t>
             </a:fld>
             <a:endParaRPr lang="en-US"/>
           </a:p>
@@ -3864,8 +3306,8 @@
         </p:nvSpPr>
         <p:spPr>
           <a:xfrm>
-            <a:off x="1847403" y="0"/>
-            <a:ext cx="6953416" cy="679867"/>
+            <a:off x="360001" y="0"/>
+            <a:ext cx="8440818" cy="679867"/>
           </a:xfrm>
         </p:spPr>
         <p:txBody>
@@ -4058,7 +3500,7 @@
             <a:fld id="{F59422E4-2DE5-B44F-B04A-4B5288EDC3DC}" type="datetime1">
               <a:rPr lang="en-US" smtClean="0"/>
               <a:pPr/>
-              <a:t>11/27/2012</a:t>
+              <a:t>11/18/2013</a:t>
             </a:fld>
             <a:endParaRPr lang="en-US"/>
           </a:p>
@@ -4080,10 +3522,10 @@
           <a:lstStyle/>
           <a:p>
             <a:r>
-              <a:rPr lang="en-US" smtClean="0"/>
-              <a:t>Pages you know.</a:t>
-            </a:r>
-            <a:endParaRPr lang="en-US"/>
+              <a:rPr lang="en-US" dirty="0" smtClean="0"/>
+              <a:t>For more information, please visit http://xiaolongzhu.org</a:t>
+            </a:r>
+            <a:endParaRPr lang="en-US" dirty="0"/>
           </a:p>
         </p:txBody>
       </p:sp>
@@ -4153,8 +3595,8 @@
         </p:nvSpPr>
         <p:spPr>
           <a:xfrm>
-            <a:off x="1870872" y="0"/>
-            <a:ext cx="6891459" cy="692695"/>
+            <a:off x="363628" y="0"/>
+            <a:ext cx="8398704" cy="692695"/>
           </a:xfrm>
         </p:spPr>
         <p:txBody>
@@ -4335,7 +3777,7 @@
             <a:fld id="{712157B5-C1DE-C442-9F32-AC8B3B3DBDDD}" type="datetime1">
               <a:rPr lang="en-US" smtClean="0"/>
               <a:pPr/>
-              <a:t>11/27/2012</a:t>
+              <a:t>11/18/2013</a:t>
             </a:fld>
             <a:endParaRPr lang="en-US" dirty="0"/>
           </a:p>
@@ -4370,8 +3812,8 @@
           </a:lstStyle>
           <a:p>
             <a:r>
-              <a:rPr lang="en-US" smtClean="0"/>
-              <a:t>Pages you know.</a:t>
+              <a:rPr lang="en-US" dirty="0" smtClean="0"/>
+              <a:t>For more information, please visit http://xiaolongzhu.org</a:t>
             </a:r>
             <a:endParaRPr lang="en-US" dirty="0"/>
           </a:p>
@@ -4438,22 +3880,20 @@
       </p:grpSpPr>
       <p:sp>
         <p:nvSpPr>
-          <p:cNvPr id="18" name="Rectangle 17"/>
+          <p:cNvPr id="21" name="Rectangle 20"/>
           <p:cNvSpPr/>
           <p:nvPr userDrawn="1"/>
         </p:nvSpPr>
         <p:spPr bwMode="ltGray">
           <a:xfrm>
-            <a:off x="-1" y="6514788"/>
-            <a:ext cx="9163419" cy="359997"/>
+            <a:off x="359999" y="2"/>
+            <a:ext cx="8803419" cy="692689"/>
           </a:xfrm>
           <a:prstGeom prst="rect">
             <a:avLst/>
           </a:prstGeom>
           <a:solidFill>
-            <a:schemeClr val="accent3">
-              <a:lumMod val="50000"/>
-            </a:schemeClr>
+            <a:srgbClr val="009E60"/>
           </a:solidFill>
           <a:ln w="48000" cap="flat" cmpd="thickThin" algn="ctr">
             <a:noFill/>
@@ -4480,8 +3920,8 @@
             <a:extLst/>
           </a:lstStyle>
           <a:p>
-            <a:pPr algn="ctr" eaLnBrk="1" latinLnBrk="0" hangingPunct="1"/>
-            <a:endParaRPr kumimoji="0" lang="en-US">
+            <a:pPr algn="r" eaLnBrk="1" latinLnBrk="0" hangingPunct="1"/>
+            <a:endParaRPr kumimoji="0" lang="en-US" dirty="0">
               <a:solidFill>
                 <a:schemeClr val="accent2">
                   <a:lumMod val="75000"/>
@@ -4493,22 +3933,20 @@
       </p:sp>
       <p:sp>
         <p:nvSpPr>
-          <p:cNvPr id="20" name="Rectangle 19"/>
+          <p:cNvPr id="19" name="Rectangle 18"/>
           <p:cNvSpPr/>
           <p:nvPr userDrawn="1"/>
         </p:nvSpPr>
         <p:spPr bwMode="ltGray">
           <a:xfrm>
-            <a:off x="8816248" y="6514787"/>
-            <a:ext cx="345620" cy="359997"/>
+            <a:off x="1" y="5"/>
+            <a:ext cx="360000" cy="692689"/>
           </a:xfrm>
           <a:prstGeom prst="rect">
             <a:avLst/>
           </a:prstGeom>
           <a:solidFill>
-            <a:schemeClr val="accent2">
-              <a:lumMod val="50000"/>
-            </a:schemeClr>
+            <a:srgbClr val="4DC780"/>
           </a:solidFill>
           <a:ln w="48000" cap="flat" cmpd="thickThin" algn="ctr">
             <a:noFill/>
@@ -4535,8 +3973,8 @@
             <a:extLst/>
           </a:lstStyle>
           <a:p>
-            <a:pPr algn="ctr" eaLnBrk="1" latinLnBrk="0" hangingPunct="1"/>
-            <a:endParaRPr kumimoji="0" lang="en-US">
+            <a:pPr algn="r" eaLnBrk="1" latinLnBrk="0" hangingPunct="1"/>
+            <a:endParaRPr kumimoji="0" lang="en-US" dirty="0">
               <a:solidFill>
                 <a:schemeClr val="accent2">
                   <a:lumMod val="75000"/>
@@ -4548,22 +3986,20 @@
       </p:sp>
       <p:sp>
         <p:nvSpPr>
-          <p:cNvPr id="16" name="Rectangle 15"/>
+          <p:cNvPr id="18" name="Rectangle 17"/>
           <p:cNvSpPr/>
           <p:nvPr userDrawn="1"/>
         </p:nvSpPr>
         <p:spPr bwMode="ltGray">
           <a:xfrm>
-            <a:off x="1847403" y="-1"/>
-            <a:ext cx="6981675" cy="692696"/>
+            <a:off x="-1" y="6514788"/>
+            <a:ext cx="9163419" cy="359997"/>
           </a:xfrm>
           <a:prstGeom prst="rect">
             <a:avLst/>
           </a:prstGeom>
           <a:solidFill>
-            <a:schemeClr val="bg2">
-              <a:lumMod val="25000"/>
-            </a:schemeClr>
+            <a:srgbClr val="009E60"/>
           </a:solidFill>
           <a:ln w="48000" cap="flat" cmpd="thickThin" algn="ctr">
             <a:noFill/>
@@ -4590,8 +4026,8 @@
             <a:extLst/>
           </a:lstStyle>
           <a:p>
-            <a:pPr algn="r" eaLnBrk="1" latinLnBrk="0" hangingPunct="1"/>
-            <a:endParaRPr kumimoji="0" lang="en-US" dirty="0">
+            <a:pPr algn="ctr" eaLnBrk="1" latinLnBrk="0" hangingPunct="1"/>
+            <a:endParaRPr kumimoji="0" lang="en-US">
               <a:solidFill>
                 <a:schemeClr val="accent2">
                   <a:lumMod val="75000"/>
@@ -4603,256 +4039,20 @@
       </p:sp>
       <p:sp>
         <p:nvSpPr>
-          <p:cNvPr id="2" name="Title Placeholder 1"/>
-          <p:cNvSpPr>
-            <a:spLocks noGrp="1"/>
-          </p:cNvSpPr>
-          <p:nvPr>
-            <p:ph type="title"/>
-          </p:nvPr>
-        </p:nvSpPr>
-        <p:spPr>
-          <a:xfrm>
-            <a:off x="1847403" y="2"/>
-            <a:ext cx="6956017" cy="692690"/>
-          </a:xfrm>
-          <a:prstGeom prst="rect">
-            <a:avLst/>
-          </a:prstGeom>
-        </p:spPr>
-        <p:txBody>
-          <a:bodyPr vert="horz" lIns="91440" rIns="45720" rtlCol="0" anchor="ctr">
-            <a:noAutofit/>
-            <a:scene3d>
-              <a:camera prst="orthographicFront"/>
-              <a:lightRig rig="threePt" dir="t">
-                <a:rot lat="0" lon="0" rev="4800000"/>
-              </a:lightRig>
-            </a:scene3d>
-            <a:sp3d prstMaterial="matte">
-              <a:bevelT w="50800" h="10160"/>
-            </a:sp3d>
-          </a:bodyPr>
-          <a:lstStyle>
-            <a:extLst/>
-          </a:lstStyle>
-          <a:p>
-            <a:r>
-              <a:rPr kumimoji="0" lang="en-US" dirty="0" smtClean="0"/>
-              <a:t>Click to edit Master title style</a:t>
-            </a:r>
-            <a:endParaRPr kumimoji="0" lang="en-US" dirty="0"/>
-          </a:p>
-        </p:txBody>
-      </p:sp>
-      <p:sp>
-        <p:nvSpPr>
-          <p:cNvPr id="3" name="Text Placeholder 2"/>
-          <p:cNvSpPr>
-            <a:spLocks noGrp="1"/>
-          </p:cNvSpPr>
-          <p:nvPr>
-            <p:ph type="body" idx="1"/>
-          </p:nvPr>
-        </p:nvSpPr>
-        <p:spPr>
-          <a:xfrm>
-            <a:off x="360000" y="692694"/>
-            <a:ext cx="8443420" cy="5834859"/>
-          </a:xfrm>
-          <a:prstGeom prst="rect">
-            <a:avLst/>
-          </a:prstGeom>
-        </p:spPr>
-        <p:txBody>
-          <a:bodyPr vert="horz" lIns="54864" tIns="91440" rtlCol="0">
-            <a:normAutofit/>
-          </a:bodyPr>
-          <a:lstStyle>
-            <a:extLst/>
-          </a:lstStyle>
-          <a:p>
-            <a:pPr lvl="0" eaLnBrk="1" latinLnBrk="0" hangingPunct="1"/>
-            <a:r>
-              <a:rPr kumimoji="0" lang="en-US" dirty="0" smtClean="0"/>
-              <a:t>Click to edit Master text styles</a:t>
-            </a:r>
-          </a:p>
-          <a:p>
-            <a:pPr lvl="1" eaLnBrk="1" latinLnBrk="0" hangingPunct="1"/>
-            <a:r>
-              <a:rPr kumimoji="0" lang="en-US" dirty="0" smtClean="0"/>
-              <a:t>Second level</a:t>
-            </a:r>
-          </a:p>
-          <a:p>
-            <a:pPr lvl="2" eaLnBrk="1" latinLnBrk="0" hangingPunct="1"/>
-            <a:r>
-              <a:rPr kumimoji="0" lang="en-US" dirty="0" smtClean="0"/>
-              <a:t>Third level</a:t>
-            </a:r>
-          </a:p>
-          <a:p>
-            <a:pPr lvl="3" eaLnBrk="1" latinLnBrk="0" hangingPunct="1"/>
-            <a:r>
-              <a:rPr kumimoji="0" lang="en-US" dirty="0" smtClean="0"/>
-              <a:t>Fourth level</a:t>
-            </a:r>
-          </a:p>
-          <a:p>
-            <a:pPr lvl="4" eaLnBrk="1" latinLnBrk="0" hangingPunct="1"/>
-            <a:r>
-              <a:rPr kumimoji="0" lang="en-US" dirty="0" smtClean="0"/>
-              <a:t>Fifth level</a:t>
-            </a:r>
-            <a:endParaRPr kumimoji="0" lang="en-US" dirty="0"/>
-          </a:p>
-        </p:txBody>
-      </p:sp>
-      <p:sp>
-        <p:nvSpPr>
-          <p:cNvPr id="4" name="Date Placeholder 3"/>
-          <p:cNvSpPr>
-            <a:spLocks noGrp="1"/>
-          </p:cNvSpPr>
-          <p:nvPr>
-            <p:ph type="dt" sz="half" idx="2"/>
-          </p:nvPr>
-        </p:nvSpPr>
-        <p:spPr>
-          <a:xfrm>
-            <a:off x="360001" y="6527554"/>
-            <a:ext cx="1487402" cy="330446"/>
-          </a:xfrm>
-          <a:prstGeom prst="rect">
-            <a:avLst/>
-          </a:prstGeom>
-        </p:spPr>
-        <p:txBody>
-          <a:bodyPr vert="horz" lIns="109728" rIns="45720" bIns="0" rtlCol="0" anchor="ctr"/>
-          <a:lstStyle>
-            <a:lvl1pPr algn="l" eaLnBrk="1" latinLnBrk="0" hangingPunct="1">
-              <a:defRPr kumimoji="0" sz="1200">
-                <a:solidFill>
-                  <a:srgbClr val="FFFFFF"/>
-                </a:solidFill>
-              </a:defRPr>
-            </a:lvl1pPr>
-            <a:extLst/>
-          </a:lstStyle>
-          <a:p>
-            <a:fld id="{FDEDFCCF-60BF-3740-B6B6-663D67A894BB}" type="datetime1">
-              <a:rPr lang="en-US" smtClean="0"/>
-              <a:pPr/>
-              <a:t>11/27/2012</a:t>
-            </a:fld>
-            <a:endParaRPr lang="en-US" dirty="0"/>
-          </a:p>
-        </p:txBody>
-      </p:sp>
-      <p:sp>
-        <p:nvSpPr>
-          <p:cNvPr id="5" name="Footer Placeholder 4"/>
-          <p:cNvSpPr>
-            <a:spLocks noGrp="1"/>
-          </p:cNvSpPr>
-          <p:nvPr>
-            <p:ph type="ftr" sz="quarter" idx="3"/>
-          </p:nvPr>
-        </p:nvSpPr>
-        <p:spPr>
-          <a:xfrm>
-            <a:off x="1847403" y="6527554"/>
-            <a:ext cx="6247811" cy="330446"/>
-          </a:xfrm>
-          <a:prstGeom prst="rect">
-            <a:avLst/>
-          </a:prstGeom>
-        </p:spPr>
-        <p:txBody>
-          <a:bodyPr vert="horz" lIns="45720" rIns="45720" bIns="0" rtlCol="0" anchor="ctr"/>
-          <a:lstStyle>
-            <a:lvl1pPr algn="l" eaLnBrk="1" latinLnBrk="0" hangingPunct="1">
-              <a:defRPr kumimoji="0" sz="1200">
-                <a:solidFill>
-                  <a:srgbClr val="FFFFFF"/>
-                </a:solidFill>
-                <a:latin typeface="Segoe UI" pitchFamily="34" charset="0"/>
-                <a:ea typeface="Segoe UI" pitchFamily="34" charset="0"/>
-                <a:cs typeface="Segoe UI" pitchFamily="34" charset="0"/>
-              </a:defRPr>
-            </a:lvl1pPr>
-            <a:extLst/>
-          </a:lstStyle>
-          <a:p>
-            <a:r>
-              <a:rPr lang="en-US" dirty="0" smtClean="0"/>
-              <a:t>Pages you know.</a:t>
-            </a:r>
-            <a:endParaRPr lang="en-US" dirty="0"/>
-          </a:p>
-        </p:txBody>
-      </p:sp>
-      <p:sp>
-        <p:nvSpPr>
-          <p:cNvPr id="6" name="Slide Number Placeholder 5"/>
-          <p:cNvSpPr>
-            <a:spLocks noGrp="1"/>
-          </p:cNvSpPr>
-          <p:nvPr>
-            <p:ph type="sldNum" sz="quarter" idx="4"/>
-          </p:nvPr>
-        </p:nvSpPr>
-        <p:spPr>
-          <a:xfrm>
-            <a:off x="8095215" y="6527553"/>
-            <a:ext cx="1068204" cy="347231"/>
-          </a:xfrm>
-          <a:prstGeom prst="rect">
-            <a:avLst/>
-          </a:prstGeom>
-        </p:spPr>
-        <p:txBody>
-          <a:bodyPr vert="horz" bIns="0" rtlCol="0" anchor="ctr"/>
-          <a:lstStyle>
-            <a:lvl1pPr algn="r" eaLnBrk="1" latinLnBrk="0" hangingPunct="1">
-              <a:defRPr kumimoji="0" sz="1200">
-                <a:solidFill>
-                  <a:srgbClr val="FFFFFF"/>
-                </a:solidFill>
-              </a:defRPr>
-            </a:lvl1pPr>
-            <a:extLst/>
-          </a:lstStyle>
-          <a:p>
-            <a:fld id="{D78EC303-C52C-464C-ACAF-04B27DC9A63D}" type="slidenum">
-              <a:rPr lang="en-US" smtClean="0"/>
-              <a:pPr/>
-              <a:t>‹#›</a:t>
-            </a:fld>
-            <a:endParaRPr lang="en-US" dirty="0"/>
-          </a:p>
-        </p:txBody>
-      </p:sp>
-      <p:sp>
-        <p:nvSpPr>
-          <p:cNvPr id="11" name="Rectangle 10"/>
+          <p:cNvPr id="20" name="Rectangle 19"/>
           <p:cNvSpPr/>
           <p:nvPr userDrawn="1"/>
         </p:nvSpPr>
         <p:spPr bwMode="ltGray">
           <a:xfrm>
-            <a:off x="8993256" y="2"/>
-            <a:ext cx="170163" cy="692693"/>
+            <a:off x="8816248" y="6514787"/>
+            <a:ext cx="345620" cy="359997"/>
           </a:xfrm>
           <a:prstGeom prst="rect">
             <a:avLst/>
           </a:prstGeom>
           <a:solidFill>
-            <a:schemeClr val="accent2">
-              <a:lumMod val="40000"/>
-              <a:lumOff val="60000"/>
-            </a:schemeClr>
+            <a:srgbClr val="4DC780"/>
           </a:solidFill>
           <a:ln w="48000" cap="flat" cmpd="thickThin" algn="ctr">
             <a:noFill/>
@@ -4880,55 +4080,6 @@
           </a:lstStyle>
           <a:p>
             <a:pPr algn="ctr" eaLnBrk="1" latinLnBrk="0" hangingPunct="1"/>
-            <a:endParaRPr kumimoji="0" lang="en-US"/>
-          </a:p>
-        </p:txBody>
-      </p:sp>
-      <p:sp>
-        <p:nvSpPr>
-          <p:cNvPr id="13" name="Rectangle 12"/>
-          <p:cNvSpPr/>
-          <p:nvPr userDrawn="1"/>
-        </p:nvSpPr>
-        <p:spPr bwMode="ltGray">
-          <a:xfrm>
-            <a:off x="8816249" y="-1"/>
-            <a:ext cx="175100" cy="692693"/>
-          </a:xfrm>
-          <a:prstGeom prst="rect">
-            <a:avLst/>
-          </a:prstGeom>
-          <a:solidFill>
-            <a:schemeClr val="accent2">
-              <a:lumMod val="75000"/>
-            </a:schemeClr>
-          </a:solidFill>
-          <a:ln w="48000" cap="flat" cmpd="thickThin" algn="ctr">
-            <a:noFill/>
-            <a:prstDash val="solid"/>
-          </a:ln>
-        </p:spPr>
-        <p:style>
-          <a:lnRef idx="2">
-            <a:schemeClr val="accent1"/>
-          </a:lnRef>
-          <a:fillRef idx="1">
-            <a:schemeClr val="accent1"/>
-          </a:fillRef>
-          <a:effectRef idx="0">
-            <a:schemeClr val="accent1"/>
-          </a:effectRef>
-          <a:fontRef idx="minor">
-            <a:schemeClr val="lt1"/>
-          </a:fontRef>
-        </p:style>
-        <p:txBody>
-          <a:bodyPr rtlCol="0" anchor="ctr"/>
-          <a:lstStyle>
-            <a:extLst/>
-          </a:lstStyle>
-          <a:p>
-            <a:pPr algn="ctr" eaLnBrk="1" latinLnBrk="0" hangingPunct="1"/>
             <a:endParaRPr kumimoji="0" lang="en-US">
               <a:solidFill>
                 <a:schemeClr val="accent2">
@@ -4941,168 +4092,234 @@
       </p:sp>
       <p:sp>
         <p:nvSpPr>
-          <p:cNvPr id="14" name="Rectangle 13"/>
-          <p:cNvSpPr/>
-          <p:nvPr userDrawn="1"/>
-        </p:nvSpPr>
-        <p:spPr bwMode="ltGray">
+          <p:cNvPr id="2" name="Title Placeholder 1"/>
+          <p:cNvSpPr>
+            <a:spLocks noGrp="1"/>
+          </p:cNvSpPr>
+          <p:nvPr>
+            <p:ph type="title"/>
+          </p:nvPr>
+        </p:nvSpPr>
+        <p:spPr>
           <a:xfrm>
-            <a:off x="-1566" y="-1"/>
-            <a:ext cx="180783" cy="692693"/>
+            <a:off x="360001" y="2"/>
+            <a:ext cx="8443420" cy="692690"/>
           </a:xfrm>
           <a:prstGeom prst="rect">
             <a:avLst/>
           </a:prstGeom>
-          <a:solidFill>
-            <a:schemeClr val="accent3">
-              <a:lumMod val="75000"/>
-            </a:schemeClr>
-          </a:solidFill>
-          <a:ln w="48000" cap="flat" cmpd="thickThin" algn="ctr">
-            <a:noFill/>
-            <a:prstDash val="solid"/>
-          </a:ln>
         </p:spPr>
-        <p:style>
-          <a:lnRef idx="2">
-            <a:schemeClr val="accent1"/>
-          </a:lnRef>
-          <a:fillRef idx="1">
-            <a:schemeClr val="accent1"/>
-          </a:fillRef>
-          <a:effectRef idx="0">
-            <a:schemeClr val="accent1"/>
-          </a:effectRef>
-          <a:fontRef idx="minor">
-            <a:schemeClr val="lt1"/>
-          </a:fontRef>
-        </p:style>
-        <p:txBody>
-          <a:bodyPr rtlCol="0" anchor="ctr"/>
+        <p:txBody>
+          <a:bodyPr vert="horz" lIns="91440" rIns="45720" rtlCol="0" anchor="ctr">
+            <a:noAutofit/>
+            <a:scene3d>
+              <a:camera prst="orthographicFront"/>
+              <a:lightRig rig="threePt" dir="t">
+                <a:rot lat="0" lon="0" rev="4800000"/>
+              </a:lightRig>
+            </a:scene3d>
+            <a:sp3d prstMaterial="matte">
+              <a:bevelT w="50800" h="10160"/>
+            </a:sp3d>
+          </a:bodyPr>
           <a:lstStyle>
             <a:extLst/>
           </a:lstStyle>
           <a:p>
-            <a:pPr algn="ctr" eaLnBrk="1" latinLnBrk="0" hangingPunct="1"/>
-            <a:endParaRPr kumimoji="0" lang="en-US">
-              <a:solidFill>
-                <a:schemeClr val="accent2">
-                  <a:lumMod val="75000"/>
-                </a:schemeClr>
-              </a:solidFill>
-            </a:endParaRPr>
-          </a:p>
-        </p:txBody>
-      </p:sp>
-      <p:sp>
-        <p:nvSpPr>
-          <p:cNvPr id="15" name="Rectangle 14"/>
-          <p:cNvSpPr/>
-          <p:nvPr userDrawn="1"/>
-        </p:nvSpPr>
-        <p:spPr bwMode="ltGray">
+            <a:r>
+              <a:rPr kumimoji="0" lang="en-US" dirty="0" smtClean="0"/>
+              <a:t>Click to edit Master title style</a:t>
+            </a:r>
+            <a:endParaRPr kumimoji="0" lang="en-US" dirty="0"/>
+          </a:p>
+        </p:txBody>
+      </p:sp>
+      <p:sp>
+        <p:nvSpPr>
+          <p:cNvPr id="3" name="Text Placeholder 2"/>
+          <p:cNvSpPr>
+            <a:spLocks noGrp="1"/>
+          </p:cNvSpPr>
+          <p:nvPr>
+            <p:ph type="body" idx="1"/>
+          </p:nvPr>
+        </p:nvSpPr>
+        <p:spPr>
           <a:xfrm>
-            <a:off x="180001" y="-2"/>
-            <a:ext cx="180000" cy="692693"/>
+            <a:off x="360000" y="692694"/>
+            <a:ext cx="8443420" cy="5834859"/>
           </a:xfrm>
           <a:prstGeom prst="rect">
             <a:avLst/>
           </a:prstGeom>
-          <a:solidFill>
-            <a:schemeClr val="accent3">
-              <a:lumMod val="60000"/>
-              <a:lumOff val="40000"/>
-            </a:schemeClr>
-          </a:solidFill>
-          <a:ln w="48000" cap="flat" cmpd="thickThin" algn="ctr">
-            <a:noFill/>
-            <a:prstDash val="solid"/>
-          </a:ln>
         </p:spPr>
-        <p:style>
-          <a:lnRef idx="2">
-            <a:schemeClr val="accent1"/>
-          </a:lnRef>
-          <a:fillRef idx="1">
-            <a:schemeClr val="accent1"/>
-          </a:fillRef>
-          <a:effectRef idx="0">
-            <a:schemeClr val="accent1"/>
-          </a:effectRef>
-          <a:fontRef idx="minor">
-            <a:schemeClr val="lt1"/>
-          </a:fontRef>
-        </p:style>
-        <p:txBody>
-          <a:bodyPr rtlCol="0" anchor="ctr"/>
+        <p:txBody>
+          <a:bodyPr vert="horz" lIns="54864" tIns="91440" rtlCol="0">
+            <a:normAutofit/>
+          </a:bodyPr>
           <a:lstStyle>
             <a:extLst/>
           </a:lstStyle>
           <a:p>
-            <a:pPr algn="ctr" eaLnBrk="1" latinLnBrk="0" hangingPunct="1"/>
-            <a:endParaRPr kumimoji="0" lang="en-US">
-              <a:solidFill>
-                <a:schemeClr val="accent2">
-                  <a:lumMod val="75000"/>
-                </a:schemeClr>
-              </a:solidFill>
-            </a:endParaRPr>
-          </a:p>
-        </p:txBody>
-      </p:sp>
-      <p:sp>
-        <p:nvSpPr>
-          <p:cNvPr id="21" name="Rectangle 20"/>
-          <p:cNvSpPr/>
-          <p:nvPr userDrawn="1"/>
-        </p:nvSpPr>
-        <p:spPr bwMode="ltGray">
+            <a:pPr lvl="0" eaLnBrk="1" latinLnBrk="0" hangingPunct="1"/>
+            <a:r>
+              <a:rPr kumimoji="0" lang="en-US" dirty="0" smtClean="0"/>
+              <a:t>Click to edit Master text styles</a:t>
+            </a:r>
+          </a:p>
+          <a:p>
+            <a:pPr lvl="1" eaLnBrk="1" latinLnBrk="0" hangingPunct="1"/>
+            <a:r>
+              <a:rPr kumimoji="0" lang="en-US" dirty="0" smtClean="0"/>
+              <a:t>Second level</a:t>
+            </a:r>
+          </a:p>
+          <a:p>
+            <a:pPr lvl="2" eaLnBrk="1" latinLnBrk="0" hangingPunct="1"/>
+            <a:r>
+              <a:rPr kumimoji="0" lang="en-US" dirty="0" smtClean="0"/>
+              <a:t>Third level</a:t>
+            </a:r>
+          </a:p>
+          <a:p>
+            <a:pPr lvl="3" eaLnBrk="1" latinLnBrk="0" hangingPunct="1"/>
+            <a:r>
+              <a:rPr kumimoji="0" lang="en-US" dirty="0" smtClean="0"/>
+              <a:t>Fourth level</a:t>
+            </a:r>
+          </a:p>
+          <a:p>
+            <a:pPr lvl="4" eaLnBrk="1" latinLnBrk="0" hangingPunct="1"/>
+            <a:r>
+              <a:rPr kumimoji="0" lang="en-US" dirty="0" smtClean="0"/>
+              <a:t>Fifth level</a:t>
+            </a:r>
+            <a:endParaRPr kumimoji="0" lang="en-US" dirty="0"/>
+          </a:p>
+        </p:txBody>
+      </p:sp>
+      <p:sp>
+        <p:nvSpPr>
+          <p:cNvPr id="4" name="Date Placeholder 3"/>
+          <p:cNvSpPr>
+            <a:spLocks noGrp="1"/>
+          </p:cNvSpPr>
+          <p:nvPr>
+            <p:ph type="dt" sz="half" idx="2"/>
+          </p:nvPr>
+        </p:nvSpPr>
+        <p:spPr>
           <a:xfrm>
-            <a:off x="360001" y="2"/>
-            <a:ext cx="1487402" cy="692689"/>
+            <a:off x="360001" y="6527554"/>
+            <a:ext cx="1487402" cy="330446"/>
           </a:xfrm>
           <a:prstGeom prst="rect">
             <a:avLst/>
           </a:prstGeom>
-          <a:solidFill>
-            <a:schemeClr val="tx1">
-              <a:lumMod val="50000"/>
-              <a:lumOff val="50000"/>
-            </a:schemeClr>
-          </a:solidFill>
-          <a:ln w="48000" cap="flat" cmpd="thickThin" algn="ctr">
-            <a:noFill/>
-            <a:prstDash val="solid"/>
-          </a:ln>
         </p:spPr>
-        <p:style>
-          <a:lnRef idx="2">
-            <a:schemeClr val="accent1"/>
-          </a:lnRef>
-          <a:fillRef idx="1">
-            <a:schemeClr val="accent1"/>
-          </a:fillRef>
-          <a:effectRef idx="0">
-            <a:schemeClr val="accent1"/>
-          </a:effectRef>
-          <a:fontRef idx="minor">
-            <a:schemeClr val="lt1"/>
-          </a:fontRef>
-        </p:style>
-        <p:txBody>
-          <a:bodyPr rtlCol="0" anchor="ctr"/>
+        <p:txBody>
+          <a:bodyPr vert="horz" lIns="109728" rIns="45720" bIns="0" rtlCol="0" anchor="ctr"/>
           <a:lstStyle>
+            <a:lvl1pPr algn="l" eaLnBrk="1" latinLnBrk="0" hangingPunct="1">
+              <a:defRPr kumimoji="0" sz="1200">
+                <a:solidFill>
+                  <a:srgbClr val="FFFFFF"/>
+                </a:solidFill>
+              </a:defRPr>
+            </a:lvl1pPr>
             <a:extLst/>
           </a:lstStyle>
           <a:p>
-            <a:pPr algn="r" eaLnBrk="1" latinLnBrk="0" hangingPunct="1"/>
-            <a:endParaRPr kumimoji="0" lang="en-US" dirty="0">
-              <a:solidFill>
-                <a:schemeClr val="accent2">
-                  <a:lumMod val="75000"/>
-                </a:schemeClr>
-              </a:solidFill>
-            </a:endParaRPr>
+            <a:fld id="{FDEDFCCF-60BF-3740-B6B6-663D67A894BB}" type="datetime1">
+              <a:rPr lang="en-US" smtClean="0"/>
+              <a:pPr/>
+              <a:t>11/18/2013</a:t>
+            </a:fld>
+            <a:endParaRPr lang="en-US" dirty="0"/>
+          </a:p>
+        </p:txBody>
+      </p:sp>
+      <p:sp>
+        <p:nvSpPr>
+          <p:cNvPr id="5" name="Footer Placeholder 4"/>
+          <p:cNvSpPr>
+            <a:spLocks noGrp="1"/>
+          </p:cNvSpPr>
+          <p:nvPr>
+            <p:ph type="ftr" sz="quarter" idx="3"/>
+          </p:nvPr>
+        </p:nvSpPr>
+        <p:spPr>
+          <a:xfrm>
+            <a:off x="1847403" y="6527554"/>
+            <a:ext cx="6247811" cy="330446"/>
+          </a:xfrm>
+          <a:prstGeom prst="rect">
+            <a:avLst/>
+          </a:prstGeom>
+        </p:spPr>
+        <p:txBody>
+          <a:bodyPr vert="horz" lIns="45720" rIns="45720" bIns="0" rtlCol="0" anchor="ctr"/>
+          <a:lstStyle>
+            <a:lvl1pPr algn="l" eaLnBrk="1" latinLnBrk="0" hangingPunct="1">
+              <a:defRPr kumimoji="0" sz="1200">
+                <a:solidFill>
+                  <a:srgbClr val="FFFFFF"/>
+                </a:solidFill>
+                <a:latin typeface="Segoe UI" pitchFamily="34" charset="0"/>
+                <a:ea typeface="Segoe UI" pitchFamily="34" charset="0"/>
+                <a:cs typeface="Segoe UI" pitchFamily="34" charset="0"/>
+              </a:defRPr>
+            </a:lvl1pPr>
+            <a:extLst/>
+          </a:lstStyle>
+          <a:p>
+            <a:r>
+              <a:rPr lang="en-US" dirty="0" smtClean="0"/>
+              <a:t>For more information, please visit http://xiaolongzhu.org</a:t>
+            </a:r>
+            <a:endParaRPr lang="en-US" dirty="0"/>
+          </a:p>
+        </p:txBody>
+      </p:sp>
+      <p:sp>
+        <p:nvSpPr>
+          <p:cNvPr id="6" name="Slide Number Placeholder 5"/>
+          <p:cNvSpPr>
+            <a:spLocks noGrp="1"/>
+          </p:cNvSpPr>
+          <p:nvPr>
+            <p:ph type="sldNum" sz="quarter" idx="4"/>
+          </p:nvPr>
+        </p:nvSpPr>
+        <p:spPr>
+          <a:xfrm>
+            <a:off x="8095215" y="6527553"/>
+            <a:ext cx="1068204" cy="347231"/>
+          </a:xfrm>
+          <a:prstGeom prst="rect">
+            <a:avLst/>
+          </a:prstGeom>
+        </p:spPr>
+        <p:txBody>
+          <a:bodyPr vert="horz" bIns="0" rtlCol="0" anchor="ctr"/>
+          <a:lstStyle>
+            <a:lvl1pPr algn="r" eaLnBrk="1" latinLnBrk="0" hangingPunct="1">
+              <a:defRPr kumimoji="0" sz="1200">
+                <a:solidFill>
+                  <a:srgbClr val="FFFFFF"/>
+                </a:solidFill>
+              </a:defRPr>
+            </a:lvl1pPr>
+            <a:extLst/>
+          </a:lstStyle>
+          <a:p>
+            <a:fld id="{D78EC303-C52C-464C-ACAF-04B27DC9A63D}" type="slidenum">
+              <a:rPr lang="en-US" smtClean="0"/>
+              <a:pPr/>
+              <a:t>‹#›</a:t>
+            </a:fld>
+            <a:endParaRPr lang="en-US" dirty="0"/>
           </a:p>
         </p:txBody>
       </p:sp>
@@ -5122,6 +4339,13 @@
     <p:sldLayoutId id="2147483799" r:id="rId10"/>
     <p:sldLayoutId id="2147483800" r:id="rId11"/>
   </p:sldLayoutIdLst>
+  <p:timing>
+    <p:tnLst>
+      <p:par>
+        <p:cTn id="1" dur="indefinite" restart="never" nodeType="tmRoot"/>
+      </p:par>
+    </p:tnLst>
+  </p:timing>
   <p:hf hdr="0"/>
   <p:txStyles>
     <p:titleStyle>
@@ -5132,9 +4356,7 @@
         <a:buNone/>
         <a:defRPr kumimoji="0" sz="3600" b="1" kern="1200">
           <a:solidFill>
-            <a:schemeClr val="bg1">
-              <a:lumMod val="95000"/>
-            </a:schemeClr>
+            <a:schemeClr val="bg1"/>
           </a:solidFill>
           <a:effectLst/>
           <a:latin typeface="Segoe UI" pitchFamily="34" charset="0"/>
@@ -5150,7 +4372,7 @@
           <a:spcPts val="0"/>
         </a:spcBef>
         <a:buClr>
-          <a:schemeClr val="accent1"/>
+          <a:srgbClr val="194C3E"/>
         </a:buClr>
         <a:buSzPct val="80000"/>
         <a:buFont typeface="Wingdings 2"/>
@@ -5169,7 +4391,7 @@
           <a:spcPct val="20000"/>
         </a:spcBef>
         <a:buClr>
-          <a:schemeClr val="accent2"/>
+          <a:srgbClr val="009E60"/>
         </a:buClr>
         <a:buSzPct val="90000"/>
         <a:buFont typeface="Wingdings"/>
@@ -5188,7 +4410,7 @@
           <a:spcPct val="20000"/>
         </a:spcBef>
         <a:buClr>
-          <a:schemeClr val="accent3"/>
+          <a:srgbClr val="4DC780"/>
         </a:buClr>
         <a:buFont typeface="Arial"/>
         <a:buChar char="▪"/>
@@ -5206,7 +4428,7 @@
           <a:spcPct val="20000"/>
         </a:spcBef>
         <a:buClr>
-          <a:schemeClr val="accent4"/>
+          <a:srgbClr val="194C3E"/>
         </a:buClr>
         <a:buFont typeface="Arial"/>
         <a:buChar char="▪"/>
@@ -5224,7 +4446,7 @@
           <a:spcPct val="20000"/>
         </a:spcBef>
         <a:buClr>
-          <a:schemeClr val="accent5"/>
+          <a:srgbClr val="009E60"/>
         </a:buClr>
         <a:buFont typeface="Wingdings 3"/>
         <a:buChar char=""/>
@@ -5439,78 +4661,66 @@
         </p:nvSpPr>
         <p:spPr/>
         <p:txBody>
+          <a:bodyPr>
+            <a:normAutofit/>
+          </a:bodyPr>
+          <a:lstStyle/>
+          <a:p>
+            <a:r>
+              <a:rPr lang="en-US" sz="4400" dirty="0" smtClean="0"/>
+              <a:t>PPT Template</a:t>
+            </a:r>
+            <a:endParaRPr lang="en-US" sz="4400" dirty="0"/>
+          </a:p>
+        </p:txBody>
+      </p:sp>
+      <p:sp>
+        <p:nvSpPr>
+          <p:cNvPr id="3" name="Subtitle 2"/>
+          <p:cNvSpPr>
+            <a:spLocks noGrp="1"/>
+          </p:cNvSpPr>
+          <p:nvPr>
+            <p:ph type="subTitle" idx="1"/>
+          </p:nvPr>
+        </p:nvSpPr>
+        <p:spPr/>
+        <p:txBody>
           <a:bodyPr/>
           <a:lstStyle/>
           <a:p>
+            <a:endParaRPr lang="en-US" dirty="0" smtClean="0"/>
+          </a:p>
+          <a:p>
+            <a:r>
+              <a:rPr lang="en-US" dirty="0" err="1" smtClean="0"/>
+              <a:t>Xiaolong</a:t>
+            </a:r>
             <a:r>
               <a:rPr lang="en-US" dirty="0" smtClean="0"/>
-              <a:t>Title</a:t>
-            </a:r>
-            <a:endParaRPr lang="en-US" dirty="0"/>
-          </a:p>
-        </p:txBody>
-      </p:sp>
-      <p:sp>
-        <p:nvSpPr>
-          <p:cNvPr id="3" name="Subtitle 2"/>
-          <p:cNvSpPr>
-            <a:spLocks noGrp="1"/>
-          </p:cNvSpPr>
-          <p:nvPr>
-            <p:ph type="subTitle" idx="1"/>
-          </p:nvPr>
-        </p:nvSpPr>
-        <p:spPr/>
-        <p:txBody>
-          <a:bodyPr/>
-          <a:lstStyle/>
+              <a:t> Zhu</a:t>
+            </a:r>
+          </a:p>
+          <a:p>
+            <a:r>
+              <a:rPr lang="en-US" dirty="0" smtClean="0">
+                <a:hlinkClick r:id="rId2"/>
+              </a:rPr>
+              <a:t>xlzhu@cs.hku.hk</a:t>
+            </a:r>
+            <a:endParaRPr lang="en-US" dirty="0" smtClean="0"/>
+          </a:p>
           <a:p>
             <a:r>
               <a:rPr lang="en-US" dirty="0" smtClean="0"/>
-              <a:t>Authors</a:t>
-            </a:r>
-            <a:endParaRPr lang="en-US" dirty="0"/>
-          </a:p>
-        </p:txBody>
-      </p:sp>
-      <p:sp>
-        <p:nvSpPr>
-          <p:cNvPr id="4" name="Rectangle 3"/>
-          <p:cNvSpPr/>
-          <p:nvPr/>
-        </p:nvSpPr>
-        <p:spPr>
-          <a:xfrm>
-            <a:off x="0" y="4989969"/>
-            <a:ext cx="9144000" cy="1515253"/>
-          </a:xfrm>
-          <a:prstGeom prst="rect">
-            <a:avLst/>
-          </a:prstGeom>
-        </p:spPr>
-        <p:style>
-          <a:lnRef idx="1">
-            <a:schemeClr val="dk1"/>
-          </a:lnRef>
-          <a:fillRef idx="2">
-            <a:schemeClr val="dk1"/>
-          </a:fillRef>
-          <a:effectRef idx="1">
-            <a:schemeClr val="dk1"/>
-          </a:effectRef>
-          <a:fontRef idx="minor">
-            <a:schemeClr val="dk1"/>
-          </a:fontRef>
-        </p:style>
-        <p:txBody>
-          <a:bodyPr rtlCol="0" anchor="ctr"/>
-          <a:lstStyle/>
-          <a:p>
-            <a:pPr algn="ctr"/>
+              <a:t>Nov 19, </a:t>
+            </a:r>
             <a:r>
               <a:rPr lang="en-US" dirty="0" smtClean="0"/>
-              <a:t>Banners</a:t>
-            </a:r>
+              <a:t>2013</a:t>
+            </a:r>
+          </a:p>
+          <a:p>
             <a:endParaRPr lang="en-US" dirty="0"/>
           </a:p>
         </p:txBody>
@@ -5564,188 +4774,21 @@
         </p:nvSpPr>
         <p:spPr/>
         <p:txBody>
-          <a:bodyPr anchor="b"/>
-          <a:lstStyle/>
-          <a:p>
-            <a:r>
-              <a:rPr lang="en-US" dirty="0" smtClean="0"/>
-              <a:t>This is cool!</a:t>
-            </a:r>
-            <a:endParaRPr lang="en-US" dirty="0"/>
-          </a:p>
-        </p:txBody>
-      </p:sp>
-      <p:sp>
-        <p:nvSpPr>
-          <p:cNvPr id="3" name="Content Placeholder 2"/>
-          <p:cNvSpPr>
-            <a:spLocks noGrp="1"/>
-          </p:cNvSpPr>
-          <p:nvPr>
-            <p:ph idx="1"/>
-          </p:nvPr>
-        </p:nvSpPr>
-        <p:spPr/>
-        <p:txBody>
           <a:bodyPr/>
           <a:lstStyle/>
           <a:p>
-            <a:r>
-              <a:rPr lang="en-US" dirty="0" smtClean="0"/>
-              <a:t>A</a:t>
-            </a:r>
-          </a:p>
-          <a:p>
-            <a:pPr lvl="1"/>
-            <a:r>
-              <a:rPr lang="en-US" dirty="0" smtClean="0"/>
-              <a:t>B</a:t>
-            </a:r>
-          </a:p>
-          <a:p>
-            <a:pPr lvl="2"/>
-            <a:r>
-              <a:rPr lang="en-US" dirty="0" smtClean="0"/>
-              <a:t>C</a:t>
-            </a:r>
-          </a:p>
-          <a:p>
-            <a:pPr lvl="3"/>
-            <a:r>
-              <a:rPr lang="en-US" dirty="0" smtClean="0"/>
-              <a:t>D</a:t>
-            </a:r>
-          </a:p>
-          <a:p>
-            <a:pPr lvl="4"/>
-            <a:r>
-              <a:rPr lang="en-US" dirty="0" smtClean="0"/>
-              <a:t>E</a:t>
-            </a:r>
-          </a:p>
-          <a:p>
-            <a:pPr lvl="5"/>
-            <a:r>
-              <a:rPr lang="en-US" dirty="0" smtClean="0"/>
-              <a:t>F</a:t>
-            </a:r>
-          </a:p>
-          <a:p>
-            <a:pPr lvl="4"/>
-            <a:r>
-              <a:rPr lang="en-US" dirty="0" smtClean="0"/>
-              <a:t>G</a:t>
-            </a:r>
-          </a:p>
-          <a:p>
-            <a:pPr lvl="3"/>
-            <a:r>
-              <a:rPr lang="en-US" dirty="0" smtClean="0"/>
-              <a:t>H</a:t>
-            </a:r>
-          </a:p>
-          <a:p>
-            <a:pPr lvl="2"/>
-            <a:r>
-              <a:rPr lang="en-US" dirty="0" smtClean="0"/>
-              <a:t>I</a:t>
-            </a:r>
-          </a:p>
-          <a:p>
-            <a:pPr lvl="1"/>
-            <a:r>
-              <a:rPr lang="en-US" dirty="0" smtClean="0"/>
-              <a:t>J	</a:t>
-            </a:r>
-          </a:p>
-          <a:p>
-            <a:r>
-              <a:rPr lang="en-US" dirty="0" smtClean="0"/>
-              <a:t>K</a:t>
-            </a:r>
-          </a:p>
-          <a:p>
-            <a:r>
-              <a:rPr lang="en-US" dirty="0" smtClean="0"/>
-              <a:t>L</a:t>
-            </a:r>
-          </a:p>
-          <a:p>
-            <a:r>
-              <a:rPr lang="en-US" dirty="0"/>
-              <a:t>m</a:t>
-            </a:r>
-          </a:p>
-        </p:txBody>
-      </p:sp>
-      <p:sp>
-        <p:nvSpPr>
-          <p:cNvPr id="4" name="Title 1"/>
-          <p:cNvSpPr txBox="1">
-            <a:spLocks/>
-          </p:cNvSpPr>
-          <p:nvPr/>
-        </p:nvSpPr>
-        <p:spPr>
-          <a:xfrm>
-            <a:off x="360000" y="0"/>
-            <a:ext cx="1487403" cy="692694"/>
-          </a:xfrm>
-          <a:prstGeom prst="rect">
-            <a:avLst/>
-          </a:prstGeom>
-        </p:spPr>
-        <p:txBody>
-          <a:bodyPr vert="horz" lIns="91440" rIns="45720" rtlCol="0" anchor="b">
-            <a:noAutofit/>
-            <a:scene3d>
-              <a:camera prst="orthographicFront"/>
-              <a:lightRig rig="threePt" dir="t">
-                <a:rot lat="0" lon="0" rev="4800000"/>
-              </a:lightRig>
-            </a:scene3d>
-            <a:sp3d prstMaterial="matte">
-              <a:bevelT w="50800" h="10160"/>
-            </a:sp3d>
-          </a:bodyPr>
-          <a:lstStyle>
-            <a:lvl1pPr algn="l" rtl="0" eaLnBrk="1" latinLnBrk="0" hangingPunct="1">
-              <a:spcBef>
-                <a:spcPct val="0"/>
-              </a:spcBef>
-              <a:buNone/>
-              <a:defRPr kumimoji="0" sz="3600" b="1" kern="1200">
-                <a:solidFill>
-                  <a:schemeClr val="bg1">
-                    <a:lumMod val="95000"/>
-                  </a:schemeClr>
-                </a:solidFill>
-                <a:effectLst/>
-                <a:latin typeface="+mj-lt"/>
-                <a:ea typeface="+mj-ea"/>
-                <a:cs typeface="+mj-cs"/>
-              </a:defRPr>
-            </a:lvl1pPr>
-            <a:extLst/>
-          </a:lstStyle>
-          <a:p>
-            <a:pPr algn="r"/>
-            <a:r>
-              <a:rPr lang="en-US" sz="2400" dirty="0" smtClean="0"/>
-              <a:t>Section</a:t>
-            </a:r>
-            <a:endParaRPr lang="en-US" sz="2400" dirty="0"/>
-          </a:p>
-        </p:txBody>
-      </p:sp>
-      <p:sp>
-        <p:nvSpPr>
-          <p:cNvPr id="5" name="Date Placeholder 4"/>
-          <p:cNvSpPr>
-            <a:spLocks noGrp="1"/>
-          </p:cNvSpPr>
-          <p:nvPr>
-            <p:ph type="dt" sz="half" idx="10"/>
+            <a:endParaRPr lang="zh-CN" altLang="en-US"/>
+          </a:p>
+        </p:txBody>
+      </p:sp>
+      <p:sp>
+        <p:nvSpPr>
+          <p:cNvPr id="3" name="Content Placeholder 2"/>
+          <p:cNvSpPr>
+            <a:spLocks noGrp="1"/>
+          </p:cNvSpPr>
+          <p:nvPr>
+            <p:ph idx="1"/>
           </p:nvPr>
         </p:nvSpPr>
         <p:spPr/>
@@ -5753,10 +4796,29 @@
           <a:bodyPr/>
           <a:lstStyle/>
           <a:p>
-            <a:fld id="{F22CE95E-7377-294A-9DD7-0645117B5595}" type="datetime1">
+            <a:endParaRPr lang="zh-CN" altLang="en-US"/>
+          </a:p>
+        </p:txBody>
+      </p:sp>
+      <p:sp>
+        <p:nvSpPr>
+          <p:cNvPr id="4" name="Date Placeholder 3"/>
+          <p:cNvSpPr>
+            <a:spLocks noGrp="1"/>
+          </p:cNvSpPr>
+          <p:nvPr>
+            <p:ph type="dt" sz="half" idx="10"/>
+          </p:nvPr>
+        </p:nvSpPr>
+        <p:spPr/>
+        <p:txBody>
+          <a:bodyPr/>
+          <a:lstStyle/>
+          <a:p>
+            <a:fld id="{10A2821B-4DD2-0F4D-8A21-133DBD86BA02}" type="datetime1">
               <a:rPr lang="en-US" smtClean="0"/>
               <a:pPr/>
-              <a:t>11/27/2012</a:t>
+              <a:t>11/18/2013</a:t>
             </a:fld>
             <a:endParaRPr lang="en-US"/>
           </a:p>
@@ -5764,7 +4826,7 @@
       </p:sp>
       <p:sp>
         <p:nvSpPr>
-          <p:cNvPr id="6" name="Footer Placeholder 5"/>
+          <p:cNvPr id="5" name="Footer Placeholder 4"/>
           <p:cNvSpPr>
             <a:spLocks noGrp="1"/>
           </p:cNvSpPr>
@@ -5779,7 +4841,7 @@
           <a:p>
             <a:r>
               <a:rPr lang="en-US" smtClean="0"/>
-              <a:t>Pages you know.</a:t>
+              <a:t>For more information, please visit http://xiaolongzhu.org</a:t>
             </a:r>
             <a:endParaRPr lang="en-US" dirty="0"/>
           </a:p>
@@ -5787,7 +4849,7 @@
       </p:sp>
       <p:sp>
         <p:nvSpPr>
-          <p:cNvPr id="7" name="Slide Number Placeholder 6"/>
+          <p:cNvPr id="6" name="Slide Number Placeholder 5"/>
           <p:cNvSpPr>
             <a:spLocks noGrp="1"/>
           </p:cNvSpPr>
@@ -5810,445 +4872,6 @@
         </p:txBody>
       </p:sp>
     </p:spTree>
-    <p:extLst>
-      <p:ext uri="{BB962C8B-B14F-4D97-AF65-F5344CB8AC3E}">
-        <p14:creationId xmlns="" xmlns:p14="http://schemas.microsoft.com/office/powerpoint/2010/main" val="224190129"/>
-      </p:ext>
-    </p:extLst>
-  </p:cSld>
-  <p:clrMapOvr>
-    <a:masterClrMapping/>
-  </p:clrMapOvr>
-</p:sld>
-</file>
-
-<file path=ppt/slides/slide3.xml><?xml version="1.0" encoding="utf-8"?>
-<p:sld xmlns:a="http://schemas.openxmlformats.org/drawingml/2006/main" xmlns:r="http://schemas.openxmlformats.org/officeDocument/2006/relationships" xmlns:p="http://schemas.openxmlformats.org/presentationml/2006/main">
-  <p:cSld>
-    <p:spTree>
-      <p:nvGrpSpPr>
-        <p:cNvPr id="1" name=""/>
-        <p:cNvGrpSpPr/>
-        <p:nvPr/>
-      </p:nvGrpSpPr>
-      <p:grpSpPr>
-        <a:xfrm>
-          <a:off x="0" y="0"/>
-          <a:ext cx="0" cy="0"/>
-          <a:chOff x="0" y="0"/>
-          <a:chExt cx="0" cy="0"/>
-        </a:xfrm>
-      </p:grpSpPr>
-      <p:sp>
-        <p:nvSpPr>
-          <p:cNvPr id="4" name="Title 3"/>
-          <p:cNvSpPr>
-            <a:spLocks noGrp="1"/>
-          </p:cNvSpPr>
-          <p:nvPr>
-            <p:ph type="title"/>
-          </p:nvPr>
-        </p:nvSpPr>
-        <p:spPr/>
-        <p:txBody>
-          <a:bodyPr/>
-          <a:lstStyle/>
-          <a:p>
-            <a:r>
-              <a:rPr lang="en-US" dirty="0" smtClean="0"/>
-              <a:t>What?!</a:t>
-            </a:r>
-            <a:endParaRPr lang="en-US" dirty="0"/>
-          </a:p>
-        </p:txBody>
-      </p:sp>
-      <p:sp>
-        <p:nvSpPr>
-          <p:cNvPr id="5" name="Text Placeholder 4"/>
-          <p:cNvSpPr>
-            <a:spLocks noGrp="1"/>
-          </p:cNvSpPr>
-          <p:nvPr>
-            <p:ph type="body" idx="1"/>
-          </p:nvPr>
-        </p:nvSpPr>
-        <p:spPr/>
-        <p:txBody>
-          <a:bodyPr/>
-          <a:lstStyle/>
-          <a:p>
-            <a:r>
-              <a:rPr lang="en-US" dirty="0" smtClean="0"/>
-              <a:t>This is fantastic!</a:t>
-            </a:r>
-            <a:endParaRPr lang="en-US" dirty="0"/>
-          </a:p>
-        </p:txBody>
-      </p:sp>
-      <p:sp>
-        <p:nvSpPr>
-          <p:cNvPr id="6" name="Date Placeholder 5"/>
-          <p:cNvSpPr>
-            <a:spLocks noGrp="1"/>
-          </p:cNvSpPr>
-          <p:nvPr>
-            <p:ph type="dt" sz="half" idx="10"/>
-          </p:nvPr>
-        </p:nvSpPr>
-        <p:spPr/>
-        <p:txBody>
-          <a:bodyPr/>
-          <a:lstStyle/>
-          <a:p>
-            <a:fld id="{FB44CAA8-A228-C543-A92C-C08767E71049}" type="datetime1">
-              <a:rPr lang="en-US" smtClean="0"/>
-              <a:pPr/>
-              <a:t>11/27/2012</a:t>
-            </a:fld>
-            <a:endParaRPr lang="en-US"/>
-          </a:p>
-        </p:txBody>
-      </p:sp>
-      <p:sp>
-        <p:nvSpPr>
-          <p:cNvPr id="7" name="Footer Placeholder 6"/>
-          <p:cNvSpPr>
-            <a:spLocks noGrp="1"/>
-          </p:cNvSpPr>
-          <p:nvPr>
-            <p:ph type="ftr" sz="quarter" idx="11"/>
-          </p:nvPr>
-        </p:nvSpPr>
-        <p:spPr/>
-        <p:txBody>
-          <a:bodyPr/>
-          <a:lstStyle/>
-          <a:p>
-            <a:r>
-              <a:rPr lang="en-US" smtClean="0"/>
-              <a:t>Pages you know.</a:t>
-            </a:r>
-            <a:endParaRPr lang="en-US"/>
-          </a:p>
-        </p:txBody>
-      </p:sp>
-      <p:sp>
-        <p:nvSpPr>
-          <p:cNvPr id="8" name="Slide Number Placeholder 7"/>
-          <p:cNvSpPr>
-            <a:spLocks noGrp="1"/>
-          </p:cNvSpPr>
-          <p:nvPr>
-            <p:ph type="sldNum" sz="quarter" idx="12"/>
-          </p:nvPr>
-        </p:nvSpPr>
-        <p:spPr/>
-        <p:txBody>
-          <a:bodyPr/>
-          <a:lstStyle/>
-          <a:p>
-            <a:fld id="{D78EC303-C52C-464C-ACAF-04B27DC9A63D}" type="slidenum">
-              <a:rPr lang="en-US" smtClean="0"/>
-              <a:pPr/>
-              <a:t>3</a:t>
-            </a:fld>
-            <a:endParaRPr lang="en-US"/>
-          </a:p>
-        </p:txBody>
-      </p:sp>
-    </p:spTree>
-    <p:extLst>
-      <p:ext uri="{BB962C8B-B14F-4D97-AF65-F5344CB8AC3E}">
-        <p14:creationId xmlns="" xmlns:p14="http://schemas.microsoft.com/office/powerpoint/2010/main" val="2821938195"/>
-      </p:ext>
-    </p:extLst>
-  </p:cSld>
-  <p:clrMapOvr>
-    <a:masterClrMapping/>
-  </p:clrMapOvr>
-</p:sld>
-</file>
-
-<file path=ppt/slides/slide4.xml><?xml version="1.0" encoding="utf-8"?>
-<p:sld xmlns:a="http://schemas.openxmlformats.org/drawingml/2006/main" xmlns:r="http://schemas.openxmlformats.org/officeDocument/2006/relationships" xmlns:p="http://schemas.openxmlformats.org/presentationml/2006/main">
-  <p:cSld>
-    <p:spTree>
-      <p:nvGrpSpPr>
-        <p:cNvPr id="1" name=""/>
-        <p:cNvGrpSpPr/>
-        <p:nvPr/>
-      </p:nvGrpSpPr>
-      <p:grpSpPr>
-        <a:xfrm>
-          <a:off x="0" y="0"/>
-          <a:ext cx="0" cy="0"/>
-          <a:chOff x="0" y="0"/>
-          <a:chExt cx="0" cy="0"/>
-        </a:xfrm>
-      </p:grpSpPr>
-      <p:sp>
-        <p:nvSpPr>
-          <p:cNvPr id="2" name="Title 1"/>
-          <p:cNvSpPr>
-            <a:spLocks noGrp="1"/>
-          </p:cNvSpPr>
-          <p:nvPr>
-            <p:ph type="title"/>
-          </p:nvPr>
-        </p:nvSpPr>
-        <p:spPr/>
-        <p:txBody>
-          <a:bodyPr anchor="b"/>
-          <a:lstStyle/>
-          <a:p>
-            <a:r>
-              <a:rPr lang="en-US" dirty="0" smtClean="0"/>
-              <a:t>This is cool!</a:t>
-            </a:r>
-            <a:endParaRPr lang="en-US" dirty="0"/>
-          </a:p>
-        </p:txBody>
-      </p:sp>
-      <p:sp>
-        <p:nvSpPr>
-          <p:cNvPr id="3" name="Content Placeholder 2"/>
-          <p:cNvSpPr>
-            <a:spLocks noGrp="1"/>
-          </p:cNvSpPr>
-          <p:nvPr>
-            <p:ph idx="1"/>
-          </p:nvPr>
-        </p:nvSpPr>
-        <p:spPr/>
-        <p:txBody>
-          <a:bodyPr/>
-          <a:lstStyle/>
-          <a:p>
-            <a:r>
-              <a:rPr lang="en-US" dirty="0" smtClean="0"/>
-              <a:t>A</a:t>
-            </a:r>
-          </a:p>
-          <a:p>
-            <a:pPr lvl="1"/>
-            <a:r>
-              <a:rPr lang="en-US" dirty="0" smtClean="0"/>
-              <a:t>B</a:t>
-            </a:r>
-          </a:p>
-          <a:p>
-            <a:pPr lvl="2"/>
-            <a:r>
-              <a:rPr lang="en-US" dirty="0" smtClean="0"/>
-              <a:t>C</a:t>
-            </a:r>
-          </a:p>
-          <a:p>
-            <a:pPr lvl="3"/>
-            <a:r>
-              <a:rPr lang="en-US" dirty="0" smtClean="0"/>
-              <a:t>D</a:t>
-            </a:r>
-          </a:p>
-          <a:p>
-            <a:pPr lvl="4"/>
-            <a:r>
-              <a:rPr lang="en-US" dirty="0" smtClean="0"/>
-              <a:t>E</a:t>
-            </a:r>
-          </a:p>
-          <a:p>
-            <a:pPr lvl="5"/>
-            <a:r>
-              <a:rPr lang="en-US" dirty="0" smtClean="0"/>
-              <a:t>F</a:t>
-            </a:r>
-          </a:p>
-          <a:p>
-            <a:pPr lvl="4"/>
-            <a:r>
-              <a:rPr lang="en-US" dirty="0" smtClean="0"/>
-              <a:t>G</a:t>
-            </a:r>
-          </a:p>
-          <a:p>
-            <a:pPr lvl="3"/>
-            <a:r>
-              <a:rPr lang="en-US" dirty="0" smtClean="0"/>
-              <a:t>H</a:t>
-            </a:r>
-          </a:p>
-          <a:p>
-            <a:pPr lvl="2"/>
-            <a:r>
-              <a:rPr lang="en-US" dirty="0" smtClean="0"/>
-              <a:t>I</a:t>
-            </a:r>
-          </a:p>
-          <a:p>
-            <a:pPr lvl="1"/>
-            <a:r>
-              <a:rPr lang="en-US" dirty="0" smtClean="0"/>
-              <a:t>J	</a:t>
-            </a:r>
-          </a:p>
-          <a:p>
-            <a:r>
-              <a:rPr lang="en-US" dirty="0" smtClean="0"/>
-              <a:t>K</a:t>
-            </a:r>
-          </a:p>
-          <a:p>
-            <a:r>
-              <a:rPr lang="en-US" dirty="0" smtClean="0"/>
-              <a:t>L</a:t>
-            </a:r>
-          </a:p>
-          <a:p>
-            <a:r>
-              <a:rPr lang="en-US" dirty="0"/>
-              <a:t>m</a:t>
-            </a:r>
-          </a:p>
-        </p:txBody>
-      </p:sp>
-      <p:sp>
-        <p:nvSpPr>
-          <p:cNvPr id="4" name="Title 1"/>
-          <p:cNvSpPr txBox="1">
-            <a:spLocks/>
-          </p:cNvSpPr>
-          <p:nvPr/>
-        </p:nvSpPr>
-        <p:spPr>
-          <a:xfrm>
-            <a:off x="360000" y="0"/>
-            <a:ext cx="1487403" cy="692694"/>
-          </a:xfrm>
-          <a:prstGeom prst="rect">
-            <a:avLst/>
-          </a:prstGeom>
-        </p:spPr>
-        <p:txBody>
-          <a:bodyPr vert="horz" lIns="91440" rIns="45720" rtlCol="0" anchor="b">
-            <a:noAutofit/>
-            <a:scene3d>
-              <a:camera prst="orthographicFront"/>
-              <a:lightRig rig="threePt" dir="t">
-                <a:rot lat="0" lon="0" rev="4800000"/>
-              </a:lightRig>
-            </a:scene3d>
-            <a:sp3d prstMaterial="matte">
-              <a:bevelT w="50800" h="10160"/>
-            </a:sp3d>
-          </a:bodyPr>
-          <a:lstStyle>
-            <a:lvl1pPr algn="l" rtl="0" eaLnBrk="1" latinLnBrk="0" hangingPunct="1">
-              <a:spcBef>
-                <a:spcPct val="0"/>
-              </a:spcBef>
-              <a:buNone/>
-              <a:defRPr kumimoji="0" sz="3600" b="1" kern="1200">
-                <a:solidFill>
-                  <a:schemeClr val="bg1">
-                    <a:lumMod val="95000"/>
-                  </a:schemeClr>
-                </a:solidFill>
-                <a:effectLst/>
-                <a:latin typeface="+mj-lt"/>
-                <a:ea typeface="+mj-ea"/>
-                <a:cs typeface="+mj-cs"/>
-              </a:defRPr>
-            </a:lvl1pPr>
-            <a:extLst/>
-          </a:lstStyle>
-          <a:p>
-            <a:pPr algn="r"/>
-            <a:r>
-              <a:rPr lang="en-US" sz="2400" dirty="0" smtClean="0"/>
-              <a:t>Section</a:t>
-            </a:r>
-            <a:endParaRPr lang="en-US" sz="2400" dirty="0"/>
-          </a:p>
-        </p:txBody>
-      </p:sp>
-      <p:sp>
-        <p:nvSpPr>
-          <p:cNvPr id="5" name="Date Placeholder 4"/>
-          <p:cNvSpPr>
-            <a:spLocks noGrp="1"/>
-          </p:cNvSpPr>
-          <p:nvPr>
-            <p:ph type="dt" sz="half" idx="10"/>
-          </p:nvPr>
-        </p:nvSpPr>
-        <p:spPr/>
-        <p:txBody>
-          <a:bodyPr/>
-          <a:lstStyle/>
-          <a:p>
-            <a:fld id="{D72B4C5A-A4CF-3C41-90E6-A666107EB9D1}" type="datetime1">
-              <a:rPr lang="en-US" smtClean="0"/>
-              <a:pPr/>
-              <a:t>11/27/2012</a:t>
-            </a:fld>
-            <a:endParaRPr lang="en-US"/>
-          </a:p>
-        </p:txBody>
-      </p:sp>
-      <p:sp>
-        <p:nvSpPr>
-          <p:cNvPr id="6" name="Footer Placeholder 5"/>
-          <p:cNvSpPr>
-            <a:spLocks noGrp="1"/>
-          </p:cNvSpPr>
-          <p:nvPr>
-            <p:ph type="ftr" sz="quarter" idx="11"/>
-          </p:nvPr>
-        </p:nvSpPr>
-        <p:spPr/>
-        <p:txBody>
-          <a:bodyPr/>
-          <a:lstStyle/>
-          <a:p>
-            <a:r>
-              <a:rPr lang="en-US" smtClean="0"/>
-              <a:t>Pages you know.</a:t>
-            </a:r>
-            <a:endParaRPr lang="en-US" dirty="0"/>
-          </a:p>
-        </p:txBody>
-      </p:sp>
-      <p:sp>
-        <p:nvSpPr>
-          <p:cNvPr id="7" name="Slide Number Placeholder 6"/>
-          <p:cNvSpPr>
-            <a:spLocks noGrp="1"/>
-          </p:cNvSpPr>
-          <p:nvPr>
-            <p:ph type="sldNum" sz="quarter" idx="12"/>
-          </p:nvPr>
-        </p:nvSpPr>
-        <p:spPr/>
-        <p:txBody>
-          <a:bodyPr/>
-          <a:lstStyle/>
-          <a:p>
-            <a:fld id="{D78EC303-C52C-464C-ACAF-04B27DC9A63D}" type="slidenum">
-              <a:rPr lang="en-US" smtClean="0"/>
-              <a:pPr/>
-              <a:t>4</a:t>
-            </a:fld>
-            <a:endParaRPr lang="en-US"/>
-          </a:p>
-        </p:txBody>
-      </p:sp>
-    </p:spTree>
-    <p:extLst>
-      <p:ext uri="{BB962C8B-B14F-4D97-AF65-F5344CB8AC3E}">
-        <p14:creationId xmlns="" xmlns:p14="http://schemas.microsoft.com/office/powerpoint/2010/main" val="3554415902"/>
-      </p:ext>
-    </p:extLst>
   </p:cSld>
   <p:clrMapOvr>
     <a:masterClrMapping/>

</xml_diff>